<commit_message>
Update Masked Autoencoders Are Scalable Vision Learners.pptx
</commit_message>
<xml_diff>
--- a/Masked Autoencoders Are Scalable Vision Learners.pptx
+++ b/Masked Autoencoders Are Scalable Vision Learners.pptx
@@ -6,7 +6,7 @@
     <p:sldMasterId id="2147483671" r:id="rId2"/>
   </p:sldMasterIdLst>
   <p:notesMasterIdLst>
-    <p:notesMasterId r:id="rId27"/>
+    <p:notesMasterId r:id="rId29"/>
   </p:notesMasterIdLst>
   <p:sldIdLst>
     <p:sldId id="256" r:id="rId3"/>
@@ -33,6 +33,8 @@
     <p:sldId id="310" r:id="rId24"/>
     <p:sldId id="309" r:id="rId25"/>
     <p:sldId id="292" r:id="rId26"/>
+    <p:sldId id="314" r:id="rId27"/>
+    <p:sldId id="315" r:id="rId28"/>
   </p:sldIdLst>
   <p:sldSz cx="9144000" cy="5143500" type="screen16x9"/>
   <p:notesSz cx="6858000" cy="9144000"/>
@@ -843,6 +845,38 @@
               </a:spcAft>
               <a:buNone/>
             </a:pPr>
+            <a:r>
+              <a:rPr lang="en-US" altLang="zh-TW" dirty="0"/>
+              <a:t>Masked</a:t>
+            </a:r>
+            <a:r>
+              <a:rPr lang="zh-TW" altLang="en-US" dirty="0"/>
+              <a:t> </a:t>
+            </a:r>
+            <a:r>
+              <a:rPr lang="en-US" altLang="zh-TW" sz="1100" b="1" dirty="0">
+                <a:solidFill>
+                  <a:schemeClr val="lt1"/>
+                </a:solidFill>
+                <a:latin typeface="Microsoft JhengHei"/>
+                <a:ea typeface="Microsoft JhengHei"/>
+                <a:cs typeface="Microsoft JhengHei"/>
+                <a:sym typeface="Microsoft JhengHei"/>
+              </a:rPr>
+              <a:t>Autoencoders</a:t>
+            </a:r>
+            <a:r>
+              <a:rPr lang="zh-TW" altLang="en-US" sz="1100" b="1" dirty="0">
+                <a:solidFill>
+                  <a:schemeClr val="lt1"/>
+                </a:solidFill>
+                <a:latin typeface="Microsoft JhengHei"/>
+                <a:ea typeface="Microsoft JhengHei"/>
+                <a:cs typeface="Microsoft JhengHei"/>
+                <a:sym typeface="Microsoft JhengHei"/>
+              </a:rPr>
+              <a:t> 是一個可拓展的視覺學習技術</a:t>
+            </a:r>
             <a:endParaRPr dirty="0"/>
           </a:p>
         </p:txBody>
@@ -1023,12 +1057,16 @@
               <a:t>iGPT</a:t>
             </a:r>
             <a:r>
-              <a:rPr lang="en-US" altLang="zh-TW" b="0" i="0" dirty="0">
+              <a:rPr lang="zh-TW" altLang="en-US" b="0" i="0" dirty="0">
                 <a:effectLst/>
                 <a:latin typeface="Arial" panose="020B0604020202020204" pitchFamily="34" charset="0"/>
               </a:rPr>
-              <a:t>  Linear Probe</a:t>
+              <a:t> 線性探測的方式</a:t>
             </a:r>
+            <a:endParaRPr lang="en-US" altLang="zh-TW" b="0" i="0" dirty="0">
+              <a:effectLst/>
+              <a:latin typeface="Arial" panose="020B0604020202020204" pitchFamily="34" charset="0"/>
+            </a:endParaRPr>
           </a:p>
           <a:p>
             <a:pPr marL="0" marR="0" lvl="0" indent="0" algn="l" rtl="0">
@@ -1067,21 +1105,7 @@
                 <a:effectLst/>
                 <a:latin typeface="Arial" panose="020B0604020202020204" pitchFamily="34" charset="0"/>
               </a:rPr>
-              <a:t>嘗試了</a:t>
-            </a:r>
-            <a:r>
-              <a:rPr lang="en-US" altLang="zh-TW" b="0" i="0" dirty="0">
-                <a:effectLst/>
-                <a:latin typeface="Arial" panose="020B0604020202020204" pitchFamily="34" charset="0"/>
-              </a:rPr>
-              <a:t>self attention </a:t>
-            </a:r>
-            <a:r>
-              <a:rPr lang="zh-TW" altLang="en-US" b="0" i="0" dirty="0">
-                <a:effectLst/>
-                <a:latin typeface="Arial" panose="020B0604020202020204" pitchFamily="34" charset="0"/>
-              </a:rPr>
-              <a:t>的方式 但結果不盡人意</a:t>
+              <a:t>嘗試了自監督學習的方式 但結果不盡人意</a:t>
             </a:r>
             <a:endParaRPr lang="en-US" altLang="zh-TW" b="0" i="0" dirty="0">
               <a:effectLst/>
@@ -2806,6 +2830,22 @@
               <a:buFont typeface="Calibri"/>
               <a:buNone/>
             </a:pPr>
+            <a:r>
+              <a:rPr lang="en-US" dirty="0"/>
+              <a:t>E</a:t>
+            </a:r>
+            <a:r>
+              <a:rPr lang="zh-TW" altLang="en-US" dirty="0"/>
+              <a:t> </a:t>
+            </a:r>
+            <a:r>
+              <a:rPr lang="en-US" altLang="zh-TW" dirty="0"/>
+              <a:t>MAE</a:t>
+            </a:r>
+            <a:r>
+              <a:rPr lang="zh-TW" altLang="en-US" dirty="0"/>
+              <a:t>對於數據增強不會太敏感</a:t>
+            </a:r>
             <a:endParaRPr dirty="0"/>
           </a:p>
         </p:txBody>
@@ -2983,6 +3023,10 @@
               <a:buFont typeface="Calibri"/>
               <a:buNone/>
             </a:pPr>
+            <a:r>
+              <a:rPr lang="zh-TW" altLang="en-US" dirty="0"/>
+              <a:t>最簡單的效果是最好的</a:t>
+            </a:r>
             <a:endParaRPr dirty="0"/>
           </a:p>
         </p:txBody>
@@ -3688,6 +3732,42 @@
               <a:buFont typeface="Calibri"/>
               <a:buNone/>
             </a:pPr>
+            <a:r>
+              <a:rPr lang="en-US" altLang="zh-TW" dirty="0"/>
+              <a:t>1.</a:t>
+            </a:r>
+            <a:r>
+              <a:rPr lang="zh-TW" altLang="en-US" dirty="0"/>
+              <a:t>自己模型比較</a:t>
+            </a:r>
+            <a:endParaRPr lang="en-US" altLang="zh-TW" dirty="0"/>
+          </a:p>
+          <a:p>
+            <a:pPr marL="0" marR="0" lvl="0" indent="0" algn="l" rtl="0">
+              <a:lnSpc>
+                <a:spcPct val="100000"/>
+              </a:lnSpc>
+              <a:spcBef>
+                <a:spcPts val="0"/>
+              </a:spcBef>
+              <a:spcAft>
+                <a:spcPts val="0"/>
+              </a:spcAft>
+              <a:buClr>
+                <a:schemeClr val="dk1"/>
+              </a:buClr>
+              <a:buSzPts val="1200"/>
+              <a:buFont typeface="Calibri"/>
+              <a:buNone/>
+            </a:pPr>
+            <a:r>
+              <a:rPr lang="en-US" altLang="zh-TW" dirty="0"/>
+              <a:t>2.</a:t>
+            </a:r>
+            <a:r>
+              <a:rPr lang="zh-TW" altLang="en-US" dirty="0"/>
+              <a:t>微調幾層網路</a:t>
+            </a:r>
             <a:endParaRPr dirty="0"/>
           </a:p>
         </p:txBody>
@@ -4042,6 +4122,42 @@
               <a:buFont typeface="Calibri"/>
               <a:buNone/>
             </a:pPr>
+            <a:r>
+              <a:rPr lang="en-US" altLang="zh-TW" dirty="0"/>
+              <a:t>1.</a:t>
+            </a:r>
+            <a:r>
+              <a:rPr lang="zh-TW" altLang="en-US" dirty="0"/>
+              <a:t>簡單可拓展的算法可做為深度學習的核心</a:t>
+            </a:r>
+            <a:endParaRPr lang="en-US" altLang="zh-TW" dirty="0"/>
+          </a:p>
+          <a:p>
+            <a:pPr marL="0" marR="0" lvl="0" indent="0" algn="l" rtl="0">
+              <a:lnSpc>
+                <a:spcPct val="100000"/>
+              </a:lnSpc>
+              <a:spcBef>
+                <a:spcPts val="0"/>
+              </a:spcBef>
+              <a:spcAft>
+                <a:spcPts val="0"/>
+              </a:spcAft>
+              <a:buClr>
+                <a:schemeClr val="dk1"/>
+              </a:buClr>
+              <a:buSzPts val="1200"/>
+              <a:buFont typeface="Calibri"/>
+              <a:buNone/>
+            </a:pPr>
+            <a:r>
+              <a:rPr lang="en-US" altLang="zh-TW" dirty="0"/>
+              <a:t>2.</a:t>
+            </a:r>
+            <a:r>
+              <a:rPr lang="zh-TW" altLang="en-US" dirty="0"/>
+              <a:t>須注意圖像與語言的區別</a:t>
+            </a:r>
             <a:endParaRPr dirty="0"/>
           </a:p>
         </p:txBody>
@@ -4209,6 +4325,401 @@
 </p:notes>
 </file>
 
+<file path=ppt/notesSlides/notesSlide25.xml><?xml version="1.0" encoding="utf-8"?>
+<p:notes xmlns:a="http://schemas.openxmlformats.org/drawingml/2006/main" xmlns:r="http://schemas.openxmlformats.org/officeDocument/2006/relationships" xmlns:p="http://schemas.openxmlformats.org/presentationml/2006/main" showMasterSp="0" showMasterPhAnim="0">
+  <p:cSld>
+    <p:spTree>
+      <p:nvGrpSpPr>
+        <p:cNvPr id="1" name="Shape 135"/>
+        <p:cNvGrpSpPr/>
+        <p:nvPr/>
+      </p:nvGrpSpPr>
+      <p:grpSpPr>
+        <a:xfrm>
+          <a:off x="0" y="0"/>
+          <a:ext cx="0" cy="0"/>
+          <a:chOff x="0" y="0"/>
+          <a:chExt cx="0" cy="0"/>
+        </a:xfrm>
+      </p:grpSpPr>
+      <p:sp>
+        <p:nvSpPr>
+          <p:cNvPr id="136" name="Google Shape;136;g1144437607e_2_96:notes"/>
+          <p:cNvSpPr>
+            <a:spLocks noGrp="1" noRot="1" noChangeAspect="1"/>
+          </p:cNvSpPr>
+          <p:nvPr>
+            <p:ph type="sldImg" idx="2"/>
+          </p:nvPr>
+        </p:nvSpPr>
+        <p:spPr>
+          <a:xfrm>
+            <a:off x="685800" y="1143000"/>
+            <a:ext cx="5486400" cy="3086100"/>
+          </a:xfrm>
+          <a:custGeom>
+            <a:avLst/>
+            <a:gdLst/>
+            <a:ahLst/>
+            <a:cxnLst/>
+            <a:rect l="l" t="t" r="r" b="b"/>
+            <a:pathLst>
+              <a:path w="120000" h="120000" extrusionOk="0">
+                <a:moveTo>
+                  <a:pt x="0" y="0"/>
+                </a:moveTo>
+                <a:lnTo>
+                  <a:pt x="120000" y="0"/>
+                </a:lnTo>
+                <a:lnTo>
+                  <a:pt x="120000" y="120000"/>
+                </a:lnTo>
+                <a:lnTo>
+                  <a:pt x="0" y="120000"/>
+                </a:lnTo>
+                <a:close/>
+              </a:path>
+            </a:pathLst>
+          </a:custGeom>
+          <a:noFill/>
+          <a:ln w="12700" cap="flat" cmpd="sng">
+            <a:solidFill>
+              <a:srgbClr val="000000"/>
+            </a:solidFill>
+            <a:prstDash val="solid"/>
+            <a:round/>
+            <a:headEnd type="none" w="sm" len="sm"/>
+            <a:tailEnd type="none" w="sm" len="sm"/>
+          </a:ln>
+        </p:spPr>
+      </p:sp>
+      <p:sp>
+        <p:nvSpPr>
+          <p:cNvPr id="137" name="Google Shape;137;g1144437607e_2_96:notes"/>
+          <p:cNvSpPr txBox="1">
+            <a:spLocks noGrp="1"/>
+          </p:cNvSpPr>
+          <p:nvPr>
+            <p:ph type="body" idx="1"/>
+          </p:nvPr>
+        </p:nvSpPr>
+        <p:spPr>
+          <a:xfrm>
+            <a:off x="685800" y="4400550"/>
+            <a:ext cx="5486400" cy="3600600"/>
+          </a:xfrm>
+          <a:prstGeom prst="rect">
+            <a:avLst/>
+          </a:prstGeom>
+          <a:noFill/>
+          <a:ln>
+            <a:noFill/>
+          </a:ln>
+        </p:spPr>
+        <p:txBody>
+          <a:bodyPr spcFirstLastPara="1" wrap="square" lIns="91425" tIns="45700" rIns="91425" bIns="45700" anchor="t" anchorCtr="0">
+            <a:noAutofit/>
+          </a:bodyPr>
+          <a:lstStyle/>
+          <a:p>
+            <a:pPr marL="0" marR="0" lvl="0" indent="0" algn="l" rtl="0">
+              <a:lnSpc>
+                <a:spcPct val="100000"/>
+              </a:lnSpc>
+              <a:spcBef>
+                <a:spcPts val="0"/>
+              </a:spcBef>
+              <a:spcAft>
+                <a:spcPts val="0"/>
+              </a:spcAft>
+              <a:buClr>
+                <a:schemeClr val="dk1"/>
+              </a:buClr>
+              <a:buSzPts val="1200"/>
+              <a:buFont typeface="Calibri"/>
+              <a:buNone/>
+            </a:pPr>
+            <a:endParaRPr/>
+          </a:p>
+        </p:txBody>
+      </p:sp>
+      <p:sp>
+        <p:nvSpPr>
+          <p:cNvPr id="138" name="Google Shape;138;g1144437607e_2_96:notes"/>
+          <p:cNvSpPr txBox="1">
+            <a:spLocks noGrp="1"/>
+          </p:cNvSpPr>
+          <p:nvPr>
+            <p:ph type="sldNum" idx="12"/>
+          </p:nvPr>
+        </p:nvSpPr>
+        <p:spPr>
+          <a:xfrm>
+            <a:off x="3884613" y="8685213"/>
+            <a:ext cx="2971800" cy="458700"/>
+          </a:xfrm>
+          <a:prstGeom prst="rect">
+            <a:avLst/>
+          </a:prstGeom>
+          <a:noFill/>
+          <a:ln>
+            <a:noFill/>
+          </a:ln>
+        </p:spPr>
+        <p:txBody>
+          <a:bodyPr spcFirstLastPara="1" wrap="square" lIns="91425" tIns="45700" rIns="91425" bIns="45700" anchor="b" anchorCtr="0">
+            <a:noAutofit/>
+          </a:bodyPr>
+          <a:lstStyle/>
+          <a:p>
+            <a:pPr marL="0" lvl="0" indent="0" algn="r" rtl="0">
+              <a:spcBef>
+                <a:spcPts val="0"/>
+              </a:spcBef>
+              <a:spcAft>
+                <a:spcPts val="0"/>
+              </a:spcAft>
+              <a:buNone/>
+            </a:pPr>
+            <a:fld id="{00000000-1234-1234-1234-123412341234}" type="slidenum">
+              <a:rPr lang="en-US" altLang="zh-TW"/>
+              <a:t>25</a:t>
+            </a:fld>
+            <a:endParaRPr/>
+          </a:p>
+        </p:txBody>
+      </p:sp>
+    </p:spTree>
+    <p:extLst>
+      <p:ext uri="{BB962C8B-B14F-4D97-AF65-F5344CB8AC3E}">
+        <p14:creationId xmlns:p14="http://schemas.microsoft.com/office/powerpoint/2010/main" val="344631055"/>
+      </p:ext>
+    </p:extLst>
+  </p:cSld>
+  <p:clrMapOvr>
+    <a:masterClrMapping/>
+  </p:clrMapOvr>
+</p:notes>
+</file>
+
+<file path=ppt/notesSlides/notesSlide26.xml><?xml version="1.0" encoding="utf-8"?>
+<p:notes xmlns:a="http://schemas.openxmlformats.org/drawingml/2006/main" xmlns:r="http://schemas.openxmlformats.org/officeDocument/2006/relationships" xmlns:p="http://schemas.openxmlformats.org/presentationml/2006/main" showMasterSp="0" showMasterPhAnim="0">
+  <p:cSld>
+    <p:spTree>
+      <p:nvGrpSpPr>
+        <p:cNvPr id="1" name="Shape 159"/>
+        <p:cNvGrpSpPr/>
+        <p:nvPr/>
+      </p:nvGrpSpPr>
+      <p:grpSpPr>
+        <a:xfrm>
+          <a:off x="0" y="0"/>
+          <a:ext cx="0" cy="0"/>
+          <a:chOff x="0" y="0"/>
+          <a:chExt cx="0" cy="0"/>
+        </a:xfrm>
+      </p:grpSpPr>
+      <p:sp>
+        <p:nvSpPr>
+          <p:cNvPr id="160" name="Google Shape;160;g11584829504_1_93:notes"/>
+          <p:cNvSpPr>
+            <a:spLocks noGrp="1" noRot="1" noChangeAspect="1"/>
+          </p:cNvSpPr>
+          <p:nvPr>
+            <p:ph type="sldImg" idx="2"/>
+          </p:nvPr>
+        </p:nvSpPr>
+        <p:spPr>
+          <a:xfrm>
+            <a:off x="685800" y="1143000"/>
+            <a:ext cx="5486400" cy="3086100"/>
+          </a:xfrm>
+          <a:custGeom>
+            <a:avLst/>
+            <a:gdLst/>
+            <a:ahLst/>
+            <a:cxnLst/>
+            <a:rect l="l" t="t" r="r" b="b"/>
+            <a:pathLst>
+              <a:path w="120000" h="120000" extrusionOk="0">
+                <a:moveTo>
+                  <a:pt x="0" y="0"/>
+                </a:moveTo>
+                <a:lnTo>
+                  <a:pt x="120000" y="0"/>
+                </a:lnTo>
+                <a:lnTo>
+                  <a:pt x="120000" y="120000"/>
+                </a:lnTo>
+                <a:lnTo>
+                  <a:pt x="0" y="120000"/>
+                </a:lnTo>
+                <a:close/>
+              </a:path>
+            </a:pathLst>
+          </a:custGeom>
+          <a:noFill/>
+          <a:ln w="12700" cap="flat" cmpd="sng">
+            <a:solidFill>
+              <a:srgbClr val="000000"/>
+            </a:solidFill>
+            <a:prstDash val="solid"/>
+            <a:round/>
+            <a:headEnd type="none" w="sm" len="sm"/>
+            <a:tailEnd type="none" w="sm" len="sm"/>
+          </a:ln>
+        </p:spPr>
+      </p:sp>
+      <p:sp>
+        <p:nvSpPr>
+          <p:cNvPr id="161" name="Google Shape;161;g11584829504_1_93:notes"/>
+          <p:cNvSpPr txBox="1">
+            <a:spLocks noGrp="1"/>
+          </p:cNvSpPr>
+          <p:nvPr>
+            <p:ph type="body" idx="1"/>
+          </p:nvPr>
+        </p:nvSpPr>
+        <p:spPr>
+          <a:xfrm>
+            <a:off x="685800" y="4400550"/>
+            <a:ext cx="5486400" cy="3600600"/>
+          </a:xfrm>
+          <a:prstGeom prst="rect">
+            <a:avLst/>
+          </a:prstGeom>
+          <a:noFill/>
+          <a:ln>
+            <a:noFill/>
+          </a:ln>
+        </p:spPr>
+        <p:txBody>
+          <a:bodyPr spcFirstLastPara="1" wrap="square" lIns="91425" tIns="45700" rIns="91425" bIns="45700" anchor="t" anchorCtr="0">
+            <a:noAutofit/>
+          </a:bodyPr>
+          <a:lstStyle/>
+          <a:p>
+            <a:pPr marL="158750" indent="0" algn="l">
+              <a:buNone/>
+            </a:pPr>
+            <a:r>
+              <a:rPr lang="en-US" altLang="zh-TW" b="0" i="0" dirty="0">
+                <a:effectLst/>
+                <a:latin typeface="Arial" panose="020B0604020202020204" pitchFamily="34" charset="0"/>
+              </a:rPr>
+              <a:t>non-hierarchical</a:t>
+            </a:r>
+          </a:p>
+          <a:p>
+            <a:pPr marL="158750" marR="0" lvl="0" indent="0" algn="l" defTabSz="914400" rtl="0" eaLnBrk="1" fontAlgn="auto" latinLnBrk="0" hangingPunct="1">
+              <a:lnSpc>
+                <a:spcPct val="100000"/>
+              </a:lnSpc>
+              <a:spcBef>
+                <a:spcPts val="0"/>
+              </a:spcBef>
+              <a:spcAft>
+                <a:spcPts val="0"/>
+              </a:spcAft>
+              <a:buClr>
+                <a:srgbClr val="000000"/>
+              </a:buClr>
+              <a:buSzPts val="1100"/>
+              <a:buFont typeface="Arial"/>
+              <a:buNone/>
+              <a:tabLst/>
+              <a:defRPr/>
+            </a:pPr>
+            <a:r>
+              <a:rPr lang="zh-TW" altLang="en-US" b="0" i="0" dirty="0">
+                <a:effectLst/>
+                <a:latin typeface="Arial" panose="020B0604020202020204" pitchFamily="34" charset="0"/>
+              </a:rPr>
+              <a:t>如何將</a:t>
+            </a:r>
+            <a:r>
+              <a:rPr lang="en-US" altLang="zh-TW" b="0" i="0" dirty="0">
+                <a:effectLst/>
+                <a:latin typeface="Arial" panose="020B0604020202020204" pitchFamily="34" charset="0"/>
+              </a:rPr>
+              <a:t>Vit</a:t>
+            </a:r>
+            <a:r>
+              <a:rPr lang="zh-TW" altLang="en-US" b="0" i="0" dirty="0">
+                <a:effectLst/>
+                <a:latin typeface="Arial" panose="020B0604020202020204" pitchFamily="34" charset="0"/>
+              </a:rPr>
+              <a:t>結合</a:t>
+            </a:r>
+            <a:r>
+              <a:rPr lang="en-US" altLang="zh-TW" b="0" i="0" dirty="0">
+                <a:effectLst/>
+                <a:latin typeface="Arial" panose="020B0604020202020204" pitchFamily="34" charset="0"/>
+              </a:rPr>
+              <a:t>FPN</a:t>
+            </a:r>
+          </a:p>
+        </p:txBody>
+      </p:sp>
+      <p:sp>
+        <p:nvSpPr>
+          <p:cNvPr id="162" name="Google Shape;162;g11584829504_1_93:notes"/>
+          <p:cNvSpPr txBox="1">
+            <a:spLocks noGrp="1"/>
+          </p:cNvSpPr>
+          <p:nvPr>
+            <p:ph type="sldNum" idx="12"/>
+          </p:nvPr>
+        </p:nvSpPr>
+        <p:spPr>
+          <a:xfrm>
+            <a:off x="3884613" y="8685213"/>
+            <a:ext cx="2971800" cy="458700"/>
+          </a:xfrm>
+          <a:prstGeom prst="rect">
+            <a:avLst/>
+          </a:prstGeom>
+          <a:noFill/>
+          <a:ln>
+            <a:noFill/>
+          </a:ln>
+        </p:spPr>
+        <p:txBody>
+          <a:bodyPr spcFirstLastPara="1" wrap="square" lIns="91425" tIns="45700" rIns="91425" bIns="45700" anchor="b" anchorCtr="0">
+            <a:noAutofit/>
+          </a:bodyPr>
+          <a:lstStyle/>
+          <a:p>
+            <a:pPr marL="0" lvl="0" indent="0" algn="r" rtl="0">
+              <a:spcBef>
+                <a:spcPts val="0"/>
+              </a:spcBef>
+              <a:spcAft>
+                <a:spcPts val="0"/>
+              </a:spcAft>
+              <a:buNone/>
+            </a:pPr>
+            <a:fld id="{00000000-1234-1234-1234-123412341234}" type="slidenum">
+              <a:rPr lang="en-US" altLang="zh-TW"/>
+              <a:t>26</a:t>
+            </a:fld>
+            <a:endParaRPr/>
+          </a:p>
+        </p:txBody>
+      </p:sp>
+    </p:spTree>
+    <p:extLst>
+      <p:ext uri="{BB962C8B-B14F-4D97-AF65-F5344CB8AC3E}">
+        <p14:creationId xmlns:p14="http://schemas.microsoft.com/office/powerpoint/2010/main" val="2941209967"/>
+      </p:ext>
+    </p:extLst>
+  </p:cSld>
+  <p:clrMapOvr>
+    <a:masterClrMapping/>
+  </p:clrMapOvr>
+</p:notes>
+</file>
+
 <file path=ppt/notesSlides/notesSlide3.xml><?xml version="1.0" encoding="utf-8"?>
 <p:notes xmlns:a="http://schemas.openxmlformats.org/drawingml/2006/main" xmlns:r="http://schemas.openxmlformats.org/officeDocument/2006/relationships" xmlns:p="http://schemas.openxmlformats.org/presentationml/2006/main" showMasterSp="0" showMasterPhAnim="0">
   <p:cSld>
@@ -4734,9 +5245,86 @@
               <a:buNone/>
             </a:pPr>
             <a:r>
+              <a:rPr lang="zh-TW" altLang="en-US" dirty="0"/>
+              <a:t>但是</a:t>
+            </a:r>
+            <a:r>
               <a:rPr lang="en-US" altLang="zh-TW" dirty="0"/>
-              <a:t>1.VIT</a:t>
+              <a:t>BERT</a:t>
             </a:r>
+            <a:r>
+              <a:rPr lang="zh-TW" altLang="en-US" dirty="0"/>
+              <a:t>在拓展是視覺上卻是落後的</a:t>
+            </a:r>
+            <a:endParaRPr lang="en-US" altLang="zh-TW" dirty="0"/>
+          </a:p>
+          <a:p>
+            <a:pPr marL="0" marR="0" lvl="0" indent="0" algn="l" rtl="0">
+              <a:lnSpc>
+                <a:spcPct val="100000"/>
+              </a:lnSpc>
+              <a:spcBef>
+                <a:spcPts val="0"/>
+              </a:spcBef>
+              <a:spcAft>
+                <a:spcPts val="0"/>
+              </a:spcAft>
+              <a:buClr>
+                <a:schemeClr val="dk1"/>
+              </a:buClr>
+              <a:buSzPts val="1200"/>
+              <a:buFont typeface="Calibri"/>
+              <a:buNone/>
+            </a:pPr>
+            <a:r>
+              <a:rPr lang="en-US" altLang="zh-TW" dirty="0"/>
+              <a:t>1.</a:t>
+            </a:r>
+            <a:r>
+              <a:rPr lang="zh-TW" altLang="en-US" dirty="0"/>
+              <a:t>卷機就是一個常規的網格運算 這很難放</a:t>
+            </a:r>
+            <a:r>
+              <a:rPr lang="en-US" altLang="zh-TW" dirty="0">
+                <a:solidFill>
+                  <a:schemeClr val="tx1"/>
+                </a:solidFill>
+                <a:latin typeface="Microsoft JhengHei"/>
+                <a:ea typeface="Microsoft JhengHei"/>
+              </a:rPr>
+              <a:t>mask tokens</a:t>
+            </a:r>
+            <a:r>
+              <a:rPr lang="zh-TW" altLang="en-US" dirty="0">
+                <a:solidFill>
+                  <a:schemeClr val="tx1"/>
+                </a:solidFill>
+                <a:latin typeface="Microsoft JhengHei"/>
+                <a:ea typeface="Microsoft JhengHei"/>
+              </a:rPr>
+              <a:t> 或 位置編碼進去 </a:t>
+            </a:r>
+            <a:r>
+              <a:rPr lang="en-US" altLang="zh-TW" dirty="0">
+                <a:solidFill>
+                  <a:schemeClr val="tx1"/>
+                </a:solidFill>
+                <a:latin typeface="Microsoft JhengHei"/>
+                <a:ea typeface="Microsoft JhengHei"/>
+              </a:rPr>
+              <a:t>-&gt;Vit</a:t>
+            </a:r>
+            <a:r>
+              <a:rPr lang="zh-TW" altLang="en-US" dirty="0">
+                <a:solidFill>
+                  <a:schemeClr val="tx1"/>
+                </a:solidFill>
+                <a:latin typeface="Microsoft JhengHei"/>
+                <a:ea typeface="Microsoft JhengHei"/>
+              </a:rPr>
+              <a:t>解決了這個問題</a:t>
+            </a:r>
+            <a:endParaRPr lang="en-US" altLang="zh-TW" dirty="0"/>
           </a:p>
           <a:p>
             <a:pPr marL="0" marR="0" lvl="0" indent="0" algn="l" rtl="0">
@@ -4761,37 +5349,25 @@
               <a:t>2.</a:t>
             </a:r>
             <a:r>
+              <a:rPr lang="zh-TW" altLang="en-US" b="0" i="0" dirty="0">
+                <a:effectLst/>
+                <a:latin typeface="Arial" panose="020B0604020202020204" pitchFamily="34" charset="0"/>
+              </a:rPr>
+              <a:t>去除幾個單詞即會造成理解上的困難 </a:t>
+            </a:r>
+            <a:r>
               <a:rPr lang="en-US" altLang="zh-TW" b="0" i="0" dirty="0">
                 <a:effectLst/>
                 <a:latin typeface="Arial" panose="020B0604020202020204" pitchFamily="34" charset="0"/>
               </a:rPr>
-              <a:t> </a:t>
+              <a:t>-&gt;</a:t>
             </a:r>
-          </a:p>
-          <a:p>
-            <a:pPr marL="0" marR="0" lvl="0" indent="0" algn="l" rtl="0">
-              <a:lnSpc>
-                <a:spcPct val="100000"/>
-              </a:lnSpc>
-              <a:spcBef>
-                <a:spcPts val="0"/>
-              </a:spcBef>
-              <a:spcAft>
-                <a:spcPts val="0"/>
-              </a:spcAft>
-              <a:buClr>
-                <a:schemeClr val="dk1"/>
-              </a:buClr>
-              <a:buSzPts val="1200"/>
-              <a:buFont typeface="Calibri"/>
-              <a:buNone/>
-            </a:pPr>
             <a:r>
               <a:rPr lang="zh-TW" altLang="en-US" b="0" i="0" dirty="0">
                 <a:effectLst/>
                 <a:latin typeface="Arial" panose="020B0604020202020204" pitchFamily="34" charset="0"/>
               </a:rPr>
-              <a:t>去除幾個單詞即會造成理解上的困難</a:t>
+              <a:t> 去除高比例的圖像區塊 強制模型學習較遠距離塊間的關係</a:t>
             </a:r>
             <a:endParaRPr lang="en-US" altLang="zh-TW" b="0" i="0" dirty="0">
               <a:effectLst/>
@@ -4821,105 +5397,14 @@
                 <a:effectLst/>
                 <a:latin typeface="Arial" panose="020B0604020202020204" pitchFamily="34" charset="0"/>
               </a:rPr>
-              <a:t>a missing patch can be recovered from neighboring </a:t>
+              <a:t>3.</a:t>
             </a:r>
             <a:r>
-              <a:rPr lang="en-US" altLang="zh-TW" b="0" i="0" dirty="0" err="1">
+              <a:rPr lang="en-US" altLang="zh-TW" i="0" dirty="0">
                 <a:effectLst/>
                 <a:latin typeface="Arial" panose="020B0604020202020204" pitchFamily="34" charset="0"/>
               </a:rPr>
-              <a:t>patche</a:t>
-            </a:r>
-            <a:endParaRPr lang="en-US" altLang="zh-TW" b="0" i="0" dirty="0">
-              <a:effectLst/>
-              <a:latin typeface="Arial" panose="020B0604020202020204" pitchFamily="34" charset="0"/>
-            </a:endParaRPr>
-          </a:p>
-          <a:p>
-            <a:pPr marL="0" marR="0" lvl="0" indent="0" algn="l" rtl="0">
-              <a:lnSpc>
-                <a:spcPct val="100000"/>
-              </a:lnSpc>
-              <a:spcBef>
-                <a:spcPts val="0"/>
-              </a:spcBef>
-              <a:spcAft>
-                <a:spcPts val="0"/>
-              </a:spcAft>
-              <a:buClr>
-                <a:schemeClr val="dk1"/>
-              </a:buClr>
-              <a:buSzPts val="1200"/>
-              <a:buFont typeface="Calibri"/>
-              <a:buNone/>
-            </a:pPr>
-            <a:r>
-              <a:rPr lang="zh-TW" altLang="en-US" b="0" i="0" dirty="0">
-                <a:effectLst/>
-                <a:latin typeface="Arial" panose="020B0604020202020204" pitchFamily="34" charset="0"/>
-              </a:rPr>
-              <a:t>為了學到更好的特偵 </a:t>
-            </a:r>
-            <a:r>
-              <a:rPr lang="en-US" altLang="zh-TW" b="0" i="0" dirty="0">
-                <a:effectLst/>
-                <a:latin typeface="Arial" panose="020B0604020202020204" pitchFamily="34" charset="0"/>
-              </a:rPr>
-              <a:t>masking </a:t>
-            </a:r>
-            <a:r>
-              <a:rPr lang="en-US" altLang="zh-TW" b="0" i="0" dirty="0" err="1">
-                <a:effectLst/>
-                <a:latin typeface="Arial" panose="020B0604020202020204" pitchFamily="34" charset="0"/>
-              </a:rPr>
-              <a:t>avery</a:t>
-            </a:r>
-            <a:r>
-              <a:rPr lang="en-US" altLang="zh-TW" b="0" i="0" dirty="0">
-                <a:effectLst/>
-                <a:latin typeface="Arial" panose="020B0604020202020204" pitchFamily="34" charset="0"/>
-              </a:rPr>
-              <a:t> </a:t>
-            </a:r>
-            <a:r>
-              <a:rPr lang="en-US" altLang="zh-TW" b="0" i="0" dirty="0" err="1">
-                <a:effectLst/>
-                <a:latin typeface="Arial" panose="020B0604020202020204" pitchFamily="34" charset="0"/>
-              </a:rPr>
-              <a:t>highportion</a:t>
-            </a:r>
-            <a:r>
-              <a:rPr lang="en-US" altLang="zh-TW" b="0" i="0" dirty="0">
-                <a:effectLst/>
-                <a:latin typeface="Arial" panose="020B0604020202020204" pitchFamily="34" charset="0"/>
-              </a:rPr>
-              <a:t> of random patches.</a:t>
-            </a:r>
-          </a:p>
-          <a:p>
-            <a:pPr marL="0" marR="0" lvl="0" indent="0" algn="l" rtl="0">
-              <a:lnSpc>
-                <a:spcPct val="100000"/>
-              </a:lnSpc>
-              <a:spcBef>
-                <a:spcPts val="0"/>
-              </a:spcBef>
-              <a:spcAft>
-                <a:spcPts val="0"/>
-              </a:spcAft>
-              <a:buClr>
-                <a:schemeClr val="dk1"/>
-              </a:buClr>
-              <a:buSzPts val="1200"/>
-              <a:buFont typeface="Calibri"/>
-              <a:buNone/>
-            </a:pPr>
-            <a:r>
-              <a:rPr lang="zh-TW" altLang="en-US" b="0" i="0" dirty="0">
-                <a:effectLst/>
-                <a:latin typeface="Arial" panose="020B0604020202020204" pitchFamily="34" charset="0"/>
-              </a:rPr>
-              <a:t>這個策略需要還原刪除部分 也因此創造具有挑戰性的自監督任務 強迫模型必須理解高維特偵</a:t>
+              <a:t> vision-&gt;conv inverse language-&gt;MLP</a:t>
             </a:r>
             <a:endParaRPr dirty="0"/>
           </a:p>
@@ -5092,119 +5577,7 @@
               <a:buFont typeface="+mj-lt"/>
               <a:buAutoNum type="arabicPeriod"/>
             </a:pPr>
-            <a:r>
-              <a:rPr lang="en-US" altLang="zh-TW" dirty="0"/>
-              <a:t>Masks random patches and reconstructs missing patches.</a:t>
-            </a:r>
-          </a:p>
-          <a:p>
-            <a:pPr marL="368300" lvl="0" indent="-228600">
-              <a:lnSpc>
-                <a:spcPct val="150000"/>
-              </a:lnSpc>
-              <a:buClr>
-                <a:schemeClr val="dk1"/>
-              </a:buClr>
-              <a:buSzPts val="1400"/>
-              <a:buFont typeface="+mj-lt"/>
-              <a:buAutoNum type="arabicPeriod"/>
-            </a:pPr>
-            <a:r>
-              <a:rPr lang="en-US" altLang="zh-TW" dirty="0"/>
-              <a:t>Asymmetric</a:t>
-            </a:r>
-            <a:r>
-              <a:rPr lang="zh-TW" altLang="en-US" dirty="0"/>
-              <a:t> </a:t>
-            </a:r>
-            <a:r>
-              <a:rPr lang="en-US" altLang="zh-TW" dirty="0"/>
-              <a:t>encoder-decoder design.</a:t>
-            </a:r>
-          </a:p>
-          <a:p>
-            <a:pPr marL="368300" lvl="0" indent="-228600">
-              <a:lnSpc>
-                <a:spcPct val="150000"/>
-              </a:lnSpc>
-              <a:buClr>
-                <a:schemeClr val="dk1"/>
-              </a:buClr>
-              <a:buSzPts val="1400"/>
-              <a:buFont typeface="+mj-lt"/>
-              <a:buAutoNum type="arabicPeriod"/>
-            </a:pPr>
-            <a:r>
-              <a:rPr lang="en-US" altLang="zh-TW" dirty="0"/>
-              <a:t>Encoder on visible</a:t>
-            </a:r>
-            <a:r>
-              <a:rPr lang="zh-TW" altLang="en-US" dirty="0"/>
-              <a:t> </a:t>
-            </a:r>
-            <a:r>
-              <a:rPr lang="en-US" altLang="zh-TW" dirty="0"/>
-              <a:t>patches.</a:t>
-            </a:r>
-          </a:p>
-          <a:p>
-            <a:pPr marL="368300" lvl="0" indent="-228600">
-              <a:lnSpc>
-                <a:spcPct val="150000"/>
-              </a:lnSpc>
-              <a:buClr>
-                <a:schemeClr val="dk1"/>
-              </a:buClr>
-              <a:buSzPts val="1400"/>
-              <a:buFont typeface="+mj-lt"/>
-              <a:buAutoNum type="arabicPeriod"/>
-            </a:pPr>
-            <a:r>
-              <a:rPr lang="en-US" altLang="zh-TW" dirty="0"/>
-              <a:t>Decoder reconstructs latent representation along with mask tokens.</a:t>
-            </a:r>
-          </a:p>
-          <a:p>
-            <a:pPr marL="368300" lvl="0" indent="-228600">
-              <a:lnSpc>
-                <a:spcPct val="150000"/>
-              </a:lnSpc>
-              <a:buClr>
-                <a:schemeClr val="dk1"/>
-              </a:buClr>
-              <a:buSzPts val="1400"/>
-              <a:buFont typeface="+mj-lt"/>
-              <a:buAutoNum type="arabicPeriod"/>
-            </a:pPr>
-            <a:r>
-              <a:rPr lang="en-US" altLang="zh-TW" dirty="0"/>
-              <a:t>With MAE pre-training, </a:t>
-            </a:r>
-            <a:r>
-              <a:rPr lang="en-US" altLang="zh-TW" dirty="0" err="1"/>
-              <a:t>ViT</a:t>
-            </a:r>
-            <a:r>
-              <a:rPr lang="en-US" altLang="zh-TW" dirty="0"/>
-              <a:t>-Large/-Huge achieve 87.8% when finetuned on ImageNet-1K.</a:t>
-            </a:r>
-          </a:p>
-          <a:p>
-            <a:pPr marL="368300" lvl="0" indent="-228600">
-              <a:lnSpc>
-                <a:spcPct val="150000"/>
-              </a:lnSpc>
-              <a:buClr>
-                <a:schemeClr val="dk1"/>
-              </a:buClr>
-              <a:buSzPts val="1400"/>
-              <a:buFont typeface="+mj-lt"/>
-              <a:buAutoNum type="arabicPeriod"/>
-            </a:pPr>
-            <a:r>
-              <a:rPr lang="en-US" altLang="zh-TW" dirty="0"/>
-              <a:t>Transfer learning on object detection, instance segmentation, and semantic segmentation achieves better results than its supervised pretrain.</a:t>
-            </a:r>
+            <a:endParaRPr lang="en-US" altLang="zh-TW" dirty="0"/>
           </a:p>
         </p:txBody>
       </p:sp>
@@ -5550,6 +5923,14 @@
               <a:buFont typeface="Calibri"/>
               <a:buNone/>
             </a:pPr>
+            <a:r>
+              <a:rPr lang="en-US" dirty="0"/>
+              <a:t>2.</a:t>
+            </a:r>
+            <a:r>
+              <a:rPr lang="zh-TW" altLang="en-US" dirty="0"/>
+              <a:t>如圖</a:t>
+            </a:r>
             <a:endParaRPr dirty="0"/>
           </a:p>
         </p:txBody>
@@ -21739,34 +22120,10 @@
               </a:rPr>
               <a:t>iGPT</a:t>
             </a:r>
-            <a:r>
-              <a:rPr lang="zh-TW" altLang="en-US" b="0" i="0" dirty="0">
-                <a:effectLst/>
-                <a:latin typeface="Arial" panose="020B0604020202020204" pitchFamily="34" charset="0"/>
-              </a:rPr>
-              <a:t> </a:t>
-            </a:r>
-            <a:r>
-              <a:rPr lang="en-US" altLang="zh-TW" b="0" i="0" dirty="0">
-                <a:effectLst/>
-                <a:latin typeface="Arial" panose="020B0604020202020204" pitchFamily="34" charset="0"/>
-              </a:rPr>
-              <a:t>–</a:t>
-            </a:r>
-            <a:r>
-              <a:rPr lang="zh-TW" altLang="en-US" b="0" i="0" dirty="0">
-                <a:effectLst/>
-                <a:latin typeface="Arial" panose="020B0604020202020204" pitchFamily="34" charset="0"/>
-              </a:rPr>
-              <a:t> </a:t>
-            </a:r>
-            <a:r>
-              <a:rPr lang="en-US" altLang="zh-TW" b="0" i="0" dirty="0">
-                <a:effectLst/>
-                <a:latin typeface="Arial" panose="020B0604020202020204" pitchFamily="34" charset="0"/>
-              </a:rPr>
-              <a:t>Linear Probe</a:t>
-            </a:r>
+            <a:endParaRPr lang="en-US" altLang="zh-TW" b="0" i="0" dirty="0">
+              <a:effectLst/>
+              <a:latin typeface="Arial" panose="020B0604020202020204" pitchFamily="34" charset="0"/>
+            </a:endParaRPr>
           </a:p>
           <a:p>
             <a:pPr marL="457200" lvl="0" indent="-317500">
@@ -23782,7 +24139,7 @@
         <p:spPr>
           <a:xfrm>
             <a:off x="471900" y="713504"/>
-            <a:ext cx="8252100" cy="1154132"/>
+            <a:ext cx="8252100" cy="1800463"/>
           </a:xfrm>
           <a:prstGeom prst="rect">
             <a:avLst/>
@@ -23858,12 +24215,44 @@
                 <a:effectLst/>
                 <a:latin typeface="Arial" panose="020B0604020202020204" pitchFamily="34" charset="0"/>
               </a:rPr>
-              <a:t>224×224 crop</a:t>
+              <a:t>224×224</a:t>
             </a:r>
-            <a:endParaRPr lang="en-US" altLang="zh-TW" dirty="0">
-              <a:latin typeface="Arial" panose="020B0604020202020204" pitchFamily="34" charset="0"/>
-              <a:sym typeface="Microsoft JhengHei"/>
-            </a:endParaRPr>
+          </a:p>
+          <a:p>
+            <a:pPr marL="139700" lvl="0">
+              <a:lnSpc>
+                <a:spcPct val="150000"/>
+              </a:lnSpc>
+              <a:buClr>
+                <a:schemeClr val="dk1"/>
+              </a:buClr>
+              <a:buSzPts val="1400"/>
+            </a:pPr>
+            <a:r>
+              <a:rPr lang="en-US" altLang="zh-TW" dirty="0">
+                <a:latin typeface="Arial" panose="020B0604020202020204" pitchFamily="34" charset="0"/>
+                <a:sym typeface="Microsoft JhengHei"/>
+              </a:rPr>
+              <a:t>1.End-to-end</a:t>
+            </a:r>
+          </a:p>
+          <a:p>
+            <a:pPr marL="139700" lvl="0">
+              <a:lnSpc>
+                <a:spcPct val="150000"/>
+              </a:lnSpc>
+              <a:buClr>
+                <a:schemeClr val="dk1"/>
+              </a:buClr>
+              <a:buSzPts val="1400"/>
+            </a:pPr>
+            <a:r>
+              <a:rPr lang="en-US" altLang="zh-TW" dirty="0">
+                <a:latin typeface="Arial" panose="020B0604020202020204" pitchFamily="34" charset="0"/>
+                <a:sym typeface="Microsoft JhengHei"/>
+              </a:rPr>
+              <a:t>2.Linear Probe</a:t>
+            </a:r>
           </a:p>
         </p:txBody>
       </p:sp>
@@ -23889,7 +24278,7 @@
         </p:blipFill>
         <p:spPr>
           <a:xfrm>
-            <a:off x="132756" y="1816997"/>
+            <a:off x="2000302" y="981579"/>
             <a:ext cx="5959308" cy="751723"/>
           </a:xfrm>
           <a:prstGeom prst="rect">
@@ -23911,7 +24300,7 @@
         </p:nvSpPr>
         <p:spPr>
           <a:xfrm>
-            <a:off x="57000" y="2534277"/>
+            <a:off x="132756" y="3123239"/>
             <a:ext cx="8252100" cy="1154132"/>
           </a:xfrm>
           <a:prstGeom prst="rect">
@@ -24341,7 +24730,7 @@
         </p:blipFill>
         <p:spPr>
           <a:xfrm>
-            <a:off x="1278542" y="1958019"/>
+            <a:off x="1123559" y="2066507"/>
             <a:ext cx="7804877" cy="2198147"/>
           </a:xfrm>
           <a:prstGeom prst="rect">
@@ -26513,7 +26902,7 @@
         </p:blipFill>
         <p:spPr>
           <a:xfrm>
-            <a:off x="395438" y="2460415"/>
+            <a:off x="4086502" y="2357079"/>
             <a:ext cx="4548796" cy="2527109"/>
           </a:xfrm>
           <a:prstGeom prst="rect">
@@ -27589,7 +27978,7 @@
         <p:spPr>
           <a:xfrm>
             <a:off x="471900" y="713504"/>
-            <a:ext cx="8252100" cy="1569630"/>
+            <a:ext cx="8252100" cy="1107965"/>
           </a:xfrm>
           <a:prstGeom prst="rect">
             <a:avLst/>
@@ -27637,14 +28026,11 @@
             </a:pPr>
             <a:r>
               <a:rPr lang="en-US" altLang="zh-TW" sz="2000" dirty="0"/>
-              <a:t>Images and languages are signals of a different nature and this difference must be addressed carefully</a:t>
+              <a:t>Images and languages are signals of a different nature.</a:t>
             </a:r>
-            <a:r>
-              <a:rPr lang="en-US" altLang="zh-TW" sz="2000" dirty="0">
-                <a:latin typeface="Arial" panose="020B0604020202020204" pitchFamily="34" charset="0"/>
-              </a:rPr>
-              <a:t>.</a:t>
-            </a:r>
+            <a:endParaRPr lang="en-US" altLang="zh-TW" sz="2000" dirty="0">
+              <a:latin typeface="Arial" panose="020B0604020202020204" pitchFamily="34" charset="0"/>
+            </a:endParaRPr>
           </a:p>
         </p:txBody>
       </p:sp>
@@ -27999,6 +28385,1566 @@
 </p:sld>
 </file>
 
+<file path=ppt/slides/slide25.xml><?xml version="1.0" encoding="utf-8"?>
+<p:sld xmlns:a="http://schemas.openxmlformats.org/drawingml/2006/main" xmlns:r="http://schemas.openxmlformats.org/officeDocument/2006/relationships" xmlns:p="http://schemas.openxmlformats.org/presentationml/2006/main">
+  <p:cSld>
+    <p:spTree>
+      <p:nvGrpSpPr>
+        <p:cNvPr id="1" name="Shape 139"/>
+        <p:cNvGrpSpPr/>
+        <p:nvPr/>
+      </p:nvGrpSpPr>
+      <p:grpSpPr>
+        <a:xfrm>
+          <a:off x="0" y="0"/>
+          <a:ext cx="0" cy="0"/>
+          <a:chOff x="0" y="0"/>
+          <a:chExt cx="0" cy="0"/>
+        </a:xfrm>
+      </p:grpSpPr>
+      <p:cxnSp>
+        <p:nvCxnSpPr>
+          <p:cNvPr id="140" name="Google Shape;140;p26"/>
+          <p:cNvCxnSpPr/>
+          <p:nvPr/>
+        </p:nvCxnSpPr>
+        <p:spPr>
+          <a:xfrm rot="10800000">
+            <a:off x="471906" y="672952"/>
+            <a:ext cx="8200200" cy="0"/>
+          </a:xfrm>
+          <a:prstGeom prst="straightConnector1">
+            <a:avLst/>
+          </a:prstGeom>
+          <a:noFill/>
+          <a:ln w="38100" cap="flat" cmpd="sng">
+            <a:solidFill>
+              <a:srgbClr val="08244A"/>
+            </a:solidFill>
+            <a:prstDash val="solid"/>
+            <a:miter lim="800000"/>
+            <a:headEnd type="none" w="sm" len="sm"/>
+            <a:tailEnd type="none" w="sm" len="sm"/>
+          </a:ln>
+        </p:spPr>
+      </p:cxnSp>
+      <p:sp>
+        <p:nvSpPr>
+          <p:cNvPr id="141" name="Google Shape;141;p26"/>
+          <p:cNvSpPr txBox="1"/>
+          <p:nvPr/>
+        </p:nvSpPr>
+        <p:spPr>
+          <a:xfrm>
+            <a:off x="4312990" y="4919588"/>
+            <a:ext cx="518100" cy="238500"/>
+          </a:xfrm>
+          <a:prstGeom prst="rect">
+            <a:avLst/>
+          </a:prstGeom>
+          <a:solidFill>
+            <a:srgbClr val="08244A"/>
+          </a:solidFill>
+          <a:ln>
+            <a:noFill/>
+          </a:ln>
+        </p:spPr>
+        <p:txBody>
+          <a:bodyPr spcFirstLastPara="1" wrap="square" lIns="68575" tIns="34275" rIns="68575" bIns="34275" anchor="t" anchorCtr="0">
+            <a:spAutoFit/>
+          </a:bodyPr>
+          <a:lstStyle/>
+          <a:p>
+            <a:pPr marL="0" marR="0" lvl="0" indent="0" algn="ctr" rtl="0">
+              <a:spcBef>
+                <a:spcPts val="0"/>
+              </a:spcBef>
+              <a:spcAft>
+                <a:spcPts val="0"/>
+              </a:spcAft>
+              <a:buNone/>
+            </a:pPr>
+            <a:endParaRPr sz="1100">
+              <a:solidFill>
+                <a:schemeClr val="lt1"/>
+              </a:solidFill>
+              <a:latin typeface="Arial"/>
+              <a:ea typeface="Arial"/>
+              <a:cs typeface="Arial"/>
+              <a:sym typeface="Arial"/>
+            </a:endParaRPr>
+          </a:p>
+        </p:txBody>
+      </p:sp>
+      <p:sp>
+        <p:nvSpPr>
+          <p:cNvPr id="142" name="Google Shape;142;p26"/>
+          <p:cNvSpPr txBox="1"/>
+          <p:nvPr/>
+        </p:nvSpPr>
+        <p:spPr>
+          <a:xfrm>
+            <a:off x="7422919" y="4868275"/>
+            <a:ext cx="1660500" cy="238500"/>
+          </a:xfrm>
+          <a:prstGeom prst="rect">
+            <a:avLst/>
+          </a:prstGeom>
+          <a:noFill/>
+          <a:ln>
+            <a:noFill/>
+          </a:ln>
+        </p:spPr>
+        <p:txBody>
+          <a:bodyPr spcFirstLastPara="1" wrap="square" lIns="68575" tIns="34275" rIns="68575" bIns="34275" anchor="t" anchorCtr="0">
+            <a:spAutoFit/>
+          </a:bodyPr>
+          <a:lstStyle/>
+          <a:p>
+            <a:pPr marL="0" marR="0" lvl="0" indent="0" algn="r" rtl="0">
+              <a:spcBef>
+                <a:spcPts val="0"/>
+              </a:spcBef>
+              <a:spcAft>
+                <a:spcPts val="0"/>
+              </a:spcAft>
+              <a:buNone/>
+            </a:pPr>
+            <a:r>
+              <a:rPr lang="zh-TW" sz="1100">
+                <a:solidFill>
+                  <a:srgbClr val="A5A5A5"/>
+                </a:solidFill>
+                <a:latin typeface="Consolas"/>
+                <a:ea typeface="Consolas"/>
+                <a:cs typeface="Consolas"/>
+                <a:sym typeface="Consolas"/>
+              </a:rPr>
+              <a:t>NTUST GAMELab</a:t>
+            </a:r>
+            <a:endParaRPr sz="1100">
+              <a:solidFill>
+                <a:srgbClr val="A5A5A5"/>
+              </a:solidFill>
+              <a:latin typeface="Consolas"/>
+              <a:ea typeface="Consolas"/>
+              <a:cs typeface="Consolas"/>
+              <a:sym typeface="Consolas"/>
+            </a:endParaRPr>
+          </a:p>
+        </p:txBody>
+      </p:sp>
+      <p:sp>
+        <p:nvSpPr>
+          <p:cNvPr id="143" name="Google Shape;143;p26"/>
+          <p:cNvSpPr txBox="1">
+            <a:spLocks noGrp="1"/>
+          </p:cNvSpPr>
+          <p:nvPr>
+            <p:ph type="sldNum" idx="12"/>
+          </p:nvPr>
+        </p:nvSpPr>
+        <p:spPr>
+          <a:xfrm>
+            <a:off x="3543300" y="4904660"/>
+            <a:ext cx="2057400" cy="273900"/>
+          </a:xfrm>
+          <a:prstGeom prst="rect">
+            <a:avLst/>
+          </a:prstGeom>
+          <a:noFill/>
+          <a:ln>
+            <a:noFill/>
+          </a:ln>
+        </p:spPr>
+        <p:txBody>
+          <a:bodyPr spcFirstLastPara="1" wrap="square" lIns="68575" tIns="34275" rIns="68575" bIns="34275" anchor="ctr" anchorCtr="0">
+            <a:noAutofit/>
+          </a:bodyPr>
+          <a:lstStyle/>
+          <a:p>
+            <a:pPr marL="0" lvl="0" indent="0" algn="ctr" rtl="0">
+              <a:spcBef>
+                <a:spcPts val="0"/>
+              </a:spcBef>
+              <a:spcAft>
+                <a:spcPts val="0"/>
+              </a:spcAft>
+              <a:buNone/>
+            </a:pPr>
+            <a:fld id="{00000000-1234-1234-1234-123412341234}" type="slidenum">
+              <a:rPr lang="en-US" altLang="zh-TW" sz="1100"/>
+              <a:t>25</a:t>
+            </a:fld>
+            <a:endParaRPr sz="1100"/>
+          </a:p>
+        </p:txBody>
+      </p:sp>
+      <p:sp>
+        <p:nvSpPr>
+          <p:cNvPr id="144" name="Google Shape;144;p26"/>
+          <p:cNvSpPr txBox="1"/>
+          <p:nvPr/>
+        </p:nvSpPr>
+        <p:spPr>
+          <a:xfrm>
+            <a:off x="368600" y="246125"/>
+            <a:ext cx="5633400" cy="392400"/>
+          </a:xfrm>
+          <a:prstGeom prst="rect">
+            <a:avLst/>
+          </a:prstGeom>
+          <a:noFill/>
+          <a:ln>
+            <a:noFill/>
+          </a:ln>
+        </p:spPr>
+        <p:txBody>
+          <a:bodyPr spcFirstLastPara="1" wrap="square" lIns="68575" tIns="34275" rIns="68575" bIns="34275" anchor="t" anchorCtr="0">
+            <a:spAutoFit/>
+          </a:bodyPr>
+          <a:lstStyle/>
+          <a:p>
+            <a:pPr marL="0" marR="0" lvl="0" indent="0" algn="l" rtl="0">
+              <a:spcBef>
+                <a:spcPts val="0"/>
+              </a:spcBef>
+              <a:spcAft>
+                <a:spcPts val="0"/>
+              </a:spcAft>
+              <a:buNone/>
+            </a:pPr>
+            <a:r>
+              <a:rPr lang="en-US" altLang="zh-TW" sz="2100" b="1" dirty="0">
+                <a:solidFill>
+                  <a:srgbClr val="08244A"/>
+                </a:solidFill>
+                <a:latin typeface="Microsoft JhengHei"/>
+                <a:ea typeface="Microsoft JhengHei"/>
+                <a:cs typeface="Microsoft JhengHei"/>
+                <a:sym typeface="Microsoft JhengHei"/>
+              </a:rPr>
+              <a:t>Masked Autoencoders </a:t>
+            </a:r>
+            <a:endParaRPr sz="2100" b="1" dirty="0">
+              <a:solidFill>
+                <a:srgbClr val="08244A"/>
+              </a:solidFill>
+              <a:latin typeface="Microsoft JhengHei"/>
+              <a:ea typeface="Microsoft JhengHei"/>
+              <a:cs typeface="Microsoft JhengHei"/>
+              <a:sym typeface="Microsoft JhengHei"/>
+            </a:endParaRPr>
+          </a:p>
+        </p:txBody>
+      </p:sp>
+      <p:sp>
+        <p:nvSpPr>
+          <p:cNvPr id="145" name="Google Shape;145;p26"/>
+          <p:cNvSpPr txBox="1"/>
+          <p:nvPr/>
+        </p:nvSpPr>
+        <p:spPr>
+          <a:xfrm>
+            <a:off x="471900" y="736201"/>
+            <a:ext cx="7422300" cy="369300"/>
+          </a:xfrm>
+          <a:prstGeom prst="rect">
+            <a:avLst/>
+          </a:prstGeom>
+          <a:noFill/>
+          <a:ln>
+            <a:noFill/>
+          </a:ln>
+        </p:spPr>
+        <p:txBody>
+          <a:bodyPr spcFirstLastPara="1" wrap="square" lIns="91425" tIns="91425" rIns="91425" bIns="91425" anchor="t" anchorCtr="0">
+            <a:spAutoFit/>
+          </a:bodyPr>
+          <a:lstStyle/>
+          <a:p>
+            <a:pPr marL="0" lvl="0" indent="0" algn="l" rtl="0">
+              <a:spcBef>
+                <a:spcPts val="0"/>
+              </a:spcBef>
+              <a:spcAft>
+                <a:spcPts val="0"/>
+              </a:spcAft>
+              <a:buNone/>
+            </a:pPr>
+            <a:endParaRPr sz="1200" b="1">
+              <a:solidFill>
+                <a:schemeClr val="dk1"/>
+              </a:solidFill>
+              <a:latin typeface="Microsoft JhengHei"/>
+              <a:ea typeface="Microsoft JhengHei"/>
+              <a:cs typeface="Microsoft JhengHei"/>
+              <a:sym typeface="Microsoft JhengHei"/>
+            </a:endParaRPr>
+          </a:p>
+        </p:txBody>
+      </p:sp>
+      <p:sp>
+        <p:nvSpPr>
+          <p:cNvPr id="2" name="矩形: 圓角 1">
+            <a:extLst>
+              <a:ext uri="{FF2B5EF4-FFF2-40B4-BE49-F238E27FC236}">
+                <a16:creationId xmlns:a16="http://schemas.microsoft.com/office/drawing/2014/main" id="{5CB48FEF-3BA4-49D5-1600-917B56B0F4AB}"/>
+              </a:ext>
+            </a:extLst>
+          </p:cNvPr>
+          <p:cNvSpPr/>
+          <p:nvPr/>
+        </p:nvSpPr>
+        <p:spPr>
+          <a:xfrm>
+            <a:off x="2873887" y="1427613"/>
+            <a:ext cx="1309163" cy="815594"/>
+          </a:xfrm>
+          <a:prstGeom prst="roundRect">
+            <a:avLst/>
+          </a:prstGeom>
+        </p:spPr>
+        <p:style>
+          <a:lnRef idx="2">
+            <a:schemeClr val="accent1">
+              <a:shade val="50000"/>
+            </a:schemeClr>
+          </a:lnRef>
+          <a:fillRef idx="1">
+            <a:schemeClr val="accent1"/>
+          </a:fillRef>
+          <a:effectRef idx="0">
+            <a:schemeClr val="accent1"/>
+          </a:effectRef>
+          <a:fontRef idx="minor">
+            <a:schemeClr val="lt1"/>
+          </a:fontRef>
+        </p:style>
+        <p:txBody>
+          <a:bodyPr rtlCol="0" anchor="ctr"/>
+          <a:lstStyle/>
+          <a:p>
+            <a:pPr algn="ctr"/>
+            <a:r>
+              <a:rPr lang="en-US" altLang="zh-TW" dirty="0"/>
+              <a:t>NLP</a:t>
+            </a:r>
+            <a:endParaRPr lang="zh-TW" altLang="en-US" dirty="0"/>
+          </a:p>
+        </p:txBody>
+      </p:sp>
+      <p:sp>
+        <p:nvSpPr>
+          <p:cNvPr id="10" name="矩形: 圓角 9">
+            <a:extLst>
+              <a:ext uri="{FF2B5EF4-FFF2-40B4-BE49-F238E27FC236}">
+                <a16:creationId xmlns:a16="http://schemas.microsoft.com/office/drawing/2014/main" id="{248971D0-3A91-AAD8-6117-2346CCFC83A5}"/>
+              </a:ext>
+            </a:extLst>
+          </p:cNvPr>
+          <p:cNvSpPr/>
+          <p:nvPr/>
+        </p:nvSpPr>
+        <p:spPr>
+          <a:xfrm>
+            <a:off x="4817480" y="1424733"/>
+            <a:ext cx="1309163" cy="815594"/>
+          </a:xfrm>
+          <a:prstGeom prst="roundRect">
+            <a:avLst/>
+          </a:prstGeom>
+        </p:spPr>
+        <p:style>
+          <a:lnRef idx="2">
+            <a:schemeClr val="accent1">
+              <a:shade val="50000"/>
+            </a:schemeClr>
+          </a:lnRef>
+          <a:fillRef idx="1">
+            <a:schemeClr val="accent1"/>
+          </a:fillRef>
+          <a:effectRef idx="0">
+            <a:schemeClr val="accent1"/>
+          </a:effectRef>
+          <a:fontRef idx="minor">
+            <a:schemeClr val="lt1"/>
+          </a:fontRef>
+        </p:style>
+        <p:txBody>
+          <a:bodyPr rtlCol="0" anchor="ctr"/>
+          <a:lstStyle/>
+          <a:p>
+            <a:pPr algn="ctr"/>
+            <a:r>
+              <a:rPr lang="en-US" altLang="zh-TW" dirty="0"/>
+              <a:t>CV</a:t>
+            </a:r>
+            <a:endParaRPr lang="zh-TW" altLang="en-US" dirty="0"/>
+          </a:p>
+        </p:txBody>
+      </p:sp>
+      <p:sp>
+        <p:nvSpPr>
+          <p:cNvPr id="11" name="矩形: 圓角 10">
+            <a:extLst>
+              <a:ext uri="{FF2B5EF4-FFF2-40B4-BE49-F238E27FC236}">
+                <a16:creationId xmlns:a16="http://schemas.microsoft.com/office/drawing/2014/main" id="{74D32836-6C02-FFFA-0D6B-408E415C2D65}"/>
+              </a:ext>
+            </a:extLst>
+          </p:cNvPr>
+          <p:cNvSpPr/>
+          <p:nvPr/>
+        </p:nvSpPr>
+        <p:spPr>
+          <a:xfrm>
+            <a:off x="2769076" y="3328118"/>
+            <a:ext cx="1631301" cy="815594"/>
+          </a:xfrm>
+          <a:prstGeom prst="roundRect">
+            <a:avLst/>
+          </a:prstGeom>
+        </p:spPr>
+        <p:style>
+          <a:lnRef idx="2">
+            <a:schemeClr val="accent1">
+              <a:shade val="50000"/>
+            </a:schemeClr>
+          </a:lnRef>
+          <a:fillRef idx="1">
+            <a:schemeClr val="accent1"/>
+          </a:fillRef>
+          <a:effectRef idx="0">
+            <a:schemeClr val="accent1"/>
+          </a:effectRef>
+          <a:fontRef idx="minor">
+            <a:schemeClr val="lt1"/>
+          </a:fontRef>
+        </p:style>
+        <p:txBody>
+          <a:bodyPr rtlCol="0" anchor="ctr"/>
+          <a:lstStyle/>
+          <a:p>
+            <a:pPr algn="ctr"/>
+            <a:r>
+              <a:rPr lang="en-US" altLang="zh-TW" dirty="0"/>
+              <a:t>Transformer</a:t>
+            </a:r>
+            <a:endParaRPr lang="zh-TW" altLang="en-US" dirty="0"/>
+          </a:p>
+        </p:txBody>
+      </p:sp>
+      <p:sp>
+        <p:nvSpPr>
+          <p:cNvPr id="12" name="矩形: 圓角 11">
+            <a:extLst>
+              <a:ext uri="{FF2B5EF4-FFF2-40B4-BE49-F238E27FC236}">
+                <a16:creationId xmlns:a16="http://schemas.microsoft.com/office/drawing/2014/main" id="{C4FED806-949B-54F9-97D1-DD5A2A5269D7}"/>
+              </a:ext>
+            </a:extLst>
+          </p:cNvPr>
+          <p:cNvSpPr/>
+          <p:nvPr/>
+        </p:nvSpPr>
+        <p:spPr>
+          <a:xfrm>
+            <a:off x="4703635" y="3340039"/>
+            <a:ext cx="1631301" cy="815594"/>
+          </a:xfrm>
+          <a:prstGeom prst="roundRect">
+            <a:avLst/>
+          </a:prstGeom>
+        </p:spPr>
+        <p:style>
+          <a:lnRef idx="2">
+            <a:schemeClr val="accent1">
+              <a:shade val="50000"/>
+            </a:schemeClr>
+          </a:lnRef>
+          <a:fillRef idx="1">
+            <a:schemeClr val="accent1"/>
+          </a:fillRef>
+          <a:effectRef idx="0">
+            <a:schemeClr val="accent1"/>
+          </a:effectRef>
+          <a:fontRef idx="minor">
+            <a:schemeClr val="lt1"/>
+          </a:fontRef>
+        </p:style>
+        <p:txBody>
+          <a:bodyPr rtlCol="0" anchor="ctr"/>
+          <a:lstStyle/>
+          <a:p>
+            <a:pPr algn="ctr"/>
+            <a:r>
+              <a:rPr lang="en-US" altLang="zh-TW" dirty="0" err="1"/>
+              <a:t>ViT</a:t>
+            </a:r>
+            <a:endParaRPr lang="zh-TW" altLang="en-US" dirty="0"/>
+          </a:p>
+        </p:txBody>
+      </p:sp>
+      <p:sp>
+        <p:nvSpPr>
+          <p:cNvPr id="13" name="矩形: 圓角 12">
+            <a:extLst>
+              <a:ext uri="{FF2B5EF4-FFF2-40B4-BE49-F238E27FC236}">
+                <a16:creationId xmlns:a16="http://schemas.microsoft.com/office/drawing/2014/main" id="{D4A83F6F-698F-64EC-2164-3EB93F5F89A5}"/>
+              </a:ext>
+            </a:extLst>
+          </p:cNvPr>
+          <p:cNvSpPr/>
+          <p:nvPr/>
+        </p:nvSpPr>
+        <p:spPr>
+          <a:xfrm>
+            <a:off x="2888718" y="2369892"/>
+            <a:ext cx="1309164" cy="815594"/>
+          </a:xfrm>
+          <a:prstGeom prst="roundRect">
+            <a:avLst/>
+          </a:prstGeom>
+        </p:spPr>
+        <p:style>
+          <a:lnRef idx="2">
+            <a:schemeClr val="accent1">
+              <a:shade val="50000"/>
+            </a:schemeClr>
+          </a:lnRef>
+          <a:fillRef idx="1">
+            <a:schemeClr val="accent1"/>
+          </a:fillRef>
+          <a:effectRef idx="0">
+            <a:schemeClr val="accent1"/>
+          </a:effectRef>
+          <a:fontRef idx="minor">
+            <a:schemeClr val="lt1"/>
+          </a:fontRef>
+        </p:style>
+        <p:txBody>
+          <a:bodyPr rtlCol="0" anchor="ctr"/>
+          <a:lstStyle/>
+          <a:p>
+            <a:pPr algn="ctr"/>
+            <a:r>
+              <a:rPr lang="en-US" altLang="zh-TW" dirty="0"/>
+              <a:t>BERT</a:t>
+            </a:r>
+            <a:endParaRPr lang="zh-TW" altLang="en-US" dirty="0"/>
+          </a:p>
+        </p:txBody>
+      </p:sp>
+      <p:sp>
+        <p:nvSpPr>
+          <p:cNvPr id="14" name="矩形: 圓角 13">
+            <a:extLst>
+              <a:ext uri="{FF2B5EF4-FFF2-40B4-BE49-F238E27FC236}">
+                <a16:creationId xmlns:a16="http://schemas.microsoft.com/office/drawing/2014/main" id="{C4BA23F2-8812-59F6-518E-F0A93E67F496}"/>
+              </a:ext>
+            </a:extLst>
+          </p:cNvPr>
+          <p:cNvSpPr/>
+          <p:nvPr/>
+        </p:nvSpPr>
+        <p:spPr>
+          <a:xfrm>
+            <a:off x="4817480" y="2387502"/>
+            <a:ext cx="1309164" cy="815594"/>
+          </a:xfrm>
+          <a:prstGeom prst="roundRect">
+            <a:avLst/>
+          </a:prstGeom>
+          <a:solidFill>
+            <a:srgbClr val="FF0000"/>
+          </a:solidFill>
+        </p:spPr>
+        <p:style>
+          <a:lnRef idx="2">
+            <a:schemeClr val="accent1">
+              <a:shade val="50000"/>
+            </a:schemeClr>
+          </a:lnRef>
+          <a:fillRef idx="1">
+            <a:schemeClr val="accent1"/>
+          </a:fillRef>
+          <a:effectRef idx="0">
+            <a:schemeClr val="accent1"/>
+          </a:effectRef>
+          <a:fontRef idx="minor">
+            <a:schemeClr val="lt1"/>
+          </a:fontRef>
+        </p:style>
+        <p:txBody>
+          <a:bodyPr rtlCol="0" anchor="ctr"/>
+          <a:lstStyle/>
+          <a:p>
+            <a:pPr algn="ctr"/>
+            <a:r>
+              <a:rPr lang="en-US" altLang="zh-TW" dirty="0"/>
+              <a:t>MAE</a:t>
+            </a:r>
+            <a:endParaRPr lang="zh-TW" altLang="en-US" dirty="0"/>
+          </a:p>
+        </p:txBody>
+      </p:sp>
+      <p:sp>
+        <p:nvSpPr>
+          <p:cNvPr id="15" name="矩形: 圓角 14">
+            <a:extLst>
+              <a:ext uri="{FF2B5EF4-FFF2-40B4-BE49-F238E27FC236}">
+                <a16:creationId xmlns:a16="http://schemas.microsoft.com/office/drawing/2014/main" id="{A87EBBBB-EC30-7984-341A-38F982EE024E}"/>
+              </a:ext>
+            </a:extLst>
+          </p:cNvPr>
+          <p:cNvSpPr/>
+          <p:nvPr/>
+        </p:nvSpPr>
+        <p:spPr>
+          <a:xfrm>
+            <a:off x="1087554" y="1424733"/>
+            <a:ext cx="1309163" cy="815594"/>
+          </a:xfrm>
+          <a:prstGeom prst="roundRect">
+            <a:avLst/>
+          </a:prstGeom>
+        </p:spPr>
+        <p:style>
+          <a:lnRef idx="2">
+            <a:schemeClr val="accent1">
+              <a:shade val="50000"/>
+            </a:schemeClr>
+          </a:lnRef>
+          <a:fillRef idx="1">
+            <a:schemeClr val="accent1"/>
+          </a:fillRef>
+          <a:effectRef idx="0">
+            <a:schemeClr val="accent1"/>
+          </a:effectRef>
+          <a:fontRef idx="minor">
+            <a:schemeClr val="lt1"/>
+          </a:fontRef>
+        </p:style>
+        <p:txBody>
+          <a:bodyPr rtlCol="0" anchor="ctr"/>
+          <a:lstStyle/>
+          <a:p>
+            <a:pPr algn="ctr"/>
+            <a:r>
+              <a:rPr lang="zh-TW" altLang="en-US" dirty="0"/>
+              <a:t>領域</a:t>
+            </a:r>
+          </a:p>
+        </p:txBody>
+      </p:sp>
+      <p:sp>
+        <p:nvSpPr>
+          <p:cNvPr id="16" name="矩形: 圓角 15">
+            <a:extLst>
+              <a:ext uri="{FF2B5EF4-FFF2-40B4-BE49-F238E27FC236}">
+                <a16:creationId xmlns:a16="http://schemas.microsoft.com/office/drawing/2014/main" id="{5C397EF9-AA2D-9325-B50C-F0C9F3E136B6}"/>
+              </a:ext>
+            </a:extLst>
+          </p:cNvPr>
+          <p:cNvSpPr/>
+          <p:nvPr/>
+        </p:nvSpPr>
+        <p:spPr>
+          <a:xfrm>
+            <a:off x="1095255" y="2373351"/>
+            <a:ext cx="1309163" cy="815594"/>
+          </a:xfrm>
+          <a:prstGeom prst="roundRect">
+            <a:avLst/>
+          </a:prstGeom>
+        </p:spPr>
+        <p:style>
+          <a:lnRef idx="2">
+            <a:schemeClr val="accent1">
+              <a:shade val="50000"/>
+            </a:schemeClr>
+          </a:lnRef>
+          <a:fillRef idx="1">
+            <a:schemeClr val="accent1"/>
+          </a:fillRef>
+          <a:effectRef idx="0">
+            <a:schemeClr val="accent1"/>
+          </a:effectRef>
+          <a:fontRef idx="minor">
+            <a:schemeClr val="lt1"/>
+          </a:fontRef>
+        </p:style>
+        <p:txBody>
+          <a:bodyPr rtlCol="0" anchor="ctr"/>
+          <a:lstStyle/>
+          <a:p>
+            <a:pPr algn="ctr"/>
+            <a:r>
+              <a:rPr lang="zh-TW" altLang="en-US" dirty="0"/>
+              <a:t>自學習方法</a:t>
+            </a:r>
+          </a:p>
+        </p:txBody>
+      </p:sp>
+      <p:sp>
+        <p:nvSpPr>
+          <p:cNvPr id="17" name="矩形: 圓角 16">
+            <a:extLst>
+              <a:ext uri="{FF2B5EF4-FFF2-40B4-BE49-F238E27FC236}">
+                <a16:creationId xmlns:a16="http://schemas.microsoft.com/office/drawing/2014/main" id="{BB455FCE-D17A-8CDF-FB2E-DC29C5CBE4C9}"/>
+              </a:ext>
+            </a:extLst>
+          </p:cNvPr>
+          <p:cNvSpPr/>
+          <p:nvPr/>
+        </p:nvSpPr>
+        <p:spPr>
+          <a:xfrm>
+            <a:off x="1095254" y="3307567"/>
+            <a:ext cx="1309163" cy="815594"/>
+          </a:xfrm>
+          <a:prstGeom prst="roundRect">
+            <a:avLst/>
+          </a:prstGeom>
+        </p:spPr>
+        <p:style>
+          <a:lnRef idx="2">
+            <a:schemeClr val="accent1">
+              <a:shade val="50000"/>
+            </a:schemeClr>
+          </a:lnRef>
+          <a:fillRef idx="1">
+            <a:schemeClr val="accent1"/>
+          </a:fillRef>
+          <a:effectRef idx="0">
+            <a:schemeClr val="accent1"/>
+          </a:effectRef>
+          <a:fontRef idx="minor">
+            <a:schemeClr val="lt1"/>
+          </a:fontRef>
+        </p:style>
+        <p:txBody>
+          <a:bodyPr rtlCol="0" anchor="ctr"/>
+          <a:lstStyle/>
+          <a:p>
+            <a:pPr algn="ctr"/>
+            <a:r>
+              <a:rPr lang="zh-TW" altLang="en-US" dirty="0"/>
+              <a:t>模型</a:t>
+            </a:r>
+          </a:p>
+        </p:txBody>
+      </p:sp>
+      <p:sp>
+        <p:nvSpPr>
+          <p:cNvPr id="3" name="箭號: 向右 2">
+            <a:extLst>
+              <a:ext uri="{FF2B5EF4-FFF2-40B4-BE49-F238E27FC236}">
+                <a16:creationId xmlns:a16="http://schemas.microsoft.com/office/drawing/2014/main" id="{72AB1AA5-31BD-EC94-1BE3-8C433D182AA8}"/>
+              </a:ext>
+            </a:extLst>
+          </p:cNvPr>
+          <p:cNvSpPr/>
+          <p:nvPr/>
+        </p:nvSpPr>
+        <p:spPr>
+          <a:xfrm>
+            <a:off x="2495227" y="1798737"/>
+            <a:ext cx="273849" cy="115304"/>
+          </a:xfrm>
+          <a:prstGeom prst="rightArrow">
+            <a:avLst/>
+          </a:prstGeom>
+        </p:spPr>
+        <p:style>
+          <a:lnRef idx="2">
+            <a:schemeClr val="accent1">
+              <a:shade val="50000"/>
+            </a:schemeClr>
+          </a:lnRef>
+          <a:fillRef idx="1">
+            <a:schemeClr val="accent1"/>
+          </a:fillRef>
+          <a:effectRef idx="0">
+            <a:schemeClr val="accent1"/>
+          </a:effectRef>
+          <a:fontRef idx="minor">
+            <a:schemeClr val="lt1"/>
+          </a:fontRef>
+        </p:style>
+        <p:txBody>
+          <a:bodyPr rtlCol="0" anchor="ctr"/>
+          <a:lstStyle/>
+          <a:p>
+            <a:pPr algn="ctr"/>
+            <a:endParaRPr lang="zh-TW" altLang="en-US"/>
+          </a:p>
+        </p:txBody>
+      </p:sp>
+      <p:sp>
+        <p:nvSpPr>
+          <p:cNvPr id="19" name="箭號: 向右 18">
+            <a:extLst>
+              <a:ext uri="{FF2B5EF4-FFF2-40B4-BE49-F238E27FC236}">
+                <a16:creationId xmlns:a16="http://schemas.microsoft.com/office/drawing/2014/main" id="{4D2F7E78-D4F4-07C2-6467-188AFA817F7A}"/>
+              </a:ext>
+            </a:extLst>
+          </p:cNvPr>
+          <p:cNvSpPr/>
+          <p:nvPr/>
+        </p:nvSpPr>
+        <p:spPr>
+          <a:xfrm>
+            <a:off x="2495227" y="2702025"/>
+            <a:ext cx="273849" cy="115304"/>
+          </a:xfrm>
+          <a:prstGeom prst="rightArrow">
+            <a:avLst/>
+          </a:prstGeom>
+        </p:spPr>
+        <p:style>
+          <a:lnRef idx="2">
+            <a:schemeClr val="accent1">
+              <a:shade val="50000"/>
+            </a:schemeClr>
+          </a:lnRef>
+          <a:fillRef idx="1">
+            <a:schemeClr val="accent1"/>
+          </a:fillRef>
+          <a:effectRef idx="0">
+            <a:schemeClr val="accent1"/>
+          </a:effectRef>
+          <a:fontRef idx="minor">
+            <a:schemeClr val="lt1"/>
+          </a:fontRef>
+        </p:style>
+        <p:txBody>
+          <a:bodyPr rtlCol="0" anchor="ctr"/>
+          <a:lstStyle/>
+          <a:p>
+            <a:pPr algn="ctr"/>
+            <a:endParaRPr lang="zh-TW" altLang="en-US"/>
+          </a:p>
+        </p:txBody>
+      </p:sp>
+      <p:sp>
+        <p:nvSpPr>
+          <p:cNvPr id="20" name="箭號: 向右 19">
+            <a:extLst>
+              <a:ext uri="{FF2B5EF4-FFF2-40B4-BE49-F238E27FC236}">
+                <a16:creationId xmlns:a16="http://schemas.microsoft.com/office/drawing/2014/main" id="{BBA1F855-A128-C1F8-7F88-757017D1EB82}"/>
+              </a:ext>
+            </a:extLst>
+          </p:cNvPr>
+          <p:cNvSpPr/>
+          <p:nvPr/>
+        </p:nvSpPr>
+        <p:spPr>
+          <a:xfrm>
+            <a:off x="2472519" y="3678263"/>
+            <a:ext cx="273849" cy="115304"/>
+          </a:xfrm>
+          <a:prstGeom prst="rightArrow">
+            <a:avLst/>
+          </a:prstGeom>
+        </p:spPr>
+        <p:style>
+          <a:lnRef idx="2">
+            <a:schemeClr val="accent1">
+              <a:shade val="50000"/>
+            </a:schemeClr>
+          </a:lnRef>
+          <a:fillRef idx="1">
+            <a:schemeClr val="accent1"/>
+          </a:fillRef>
+          <a:effectRef idx="0">
+            <a:schemeClr val="accent1"/>
+          </a:effectRef>
+          <a:fontRef idx="minor">
+            <a:schemeClr val="lt1"/>
+          </a:fontRef>
+        </p:style>
+        <p:txBody>
+          <a:bodyPr rtlCol="0" anchor="ctr"/>
+          <a:lstStyle/>
+          <a:p>
+            <a:pPr algn="ctr"/>
+            <a:endParaRPr lang="zh-TW" altLang="en-US"/>
+          </a:p>
+        </p:txBody>
+      </p:sp>
+    </p:spTree>
+    <p:extLst>
+      <p:ext uri="{BB962C8B-B14F-4D97-AF65-F5344CB8AC3E}">
+        <p14:creationId xmlns:p14="http://schemas.microsoft.com/office/powerpoint/2010/main" val="847146440"/>
+      </p:ext>
+    </p:extLst>
+  </p:cSld>
+  <p:clrMapOvr>
+    <a:masterClrMapping/>
+  </p:clrMapOvr>
+  <p:transition spd="slow">
+    <p:push/>
+  </p:transition>
+</p:sld>
+</file>
+
+<file path=ppt/slides/slide26.xml><?xml version="1.0" encoding="utf-8"?>
+<p:sld xmlns:a="http://schemas.openxmlformats.org/drawingml/2006/main" xmlns:r="http://schemas.openxmlformats.org/officeDocument/2006/relationships" xmlns:p="http://schemas.openxmlformats.org/presentationml/2006/main">
+  <p:cSld>
+    <p:spTree>
+      <p:nvGrpSpPr>
+        <p:cNvPr id="1" name="Shape 163"/>
+        <p:cNvGrpSpPr/>
+        <p:nvPr/>
+      </p:nvGrpSpPr>
+      <p:grpSpPr>
+        <a:xfrm>
+          <a:off x="0" y="0"/>
+          <a:ext cx="0" cy="0"/>
+          <a:chOff x="0" y="0"/>
+          <a:chExt cx="0" cy="0"/>
+        </a:xfrm>
+      </p:grpSpPr>
+      <p:cxnSp>
+        <p:nvCxnSpPr>
+          <p:cNvPr id="164" name="Google Shape;164;p28"/>
+          <p:cNvCxnSpPr/>
+          <p:nvPr/>
+        </p:nvCxnSpPr>
+        <p:spPr>
+          <a:xfrm rot="10800000">
+            <a:off x="471906" y="672952"/>
+            <a:ext cx="8200200" cy="0"/>
+          </a:xfrm>
+          <a:prstGeom prst="straightConnector1">
+            <a:avLst/>
+          </a:prstGeom>
+          <a:noFill/>
+          <a:ln w="38100" cap="flat" cmpd="sng">
+            <a:solidFill>
+              <a:srgbClr val="08244A"/>
+            </a:solidFill>
+            <a:prstDash val="solid"/>
+            <a:miter lim="800000"/>
+            <a:headEnd type="none" w="sm" len="sm"/>
+            <a:tailEnd type="none" w="sm" len="sm"/>
+          </a:ln>
+        </p:spPr>
+      </p:cxnSp>
+      <p:sp>
+        <p:nvSpPr>
+          <p:cNvPr id="165" name="Google Shape;165;p28"/>
+          <p:cNvSpPr txBox="1"/>
+          <p:nvPr/>
+        </p:nvSpPr>
+        <p:spPr>
+          <a:xfrm>
+            <a:off x="4312990" y="4919588"/>
+            <a:ext cx="518100" cy="238500"/>
+          </a:xfrm>
+          <a:prstGeom prst="rect">
+            <a:avLst/>
+          </a:prstGeom>
+          <a:solidFill>
+            <a:srgbClr val="08244A"/>
+          </a:solidFill>
+          <a:ln>
+            <a:noFill/>
+          </a:ln>
+        </p:spPr>
+        <p:txBody>
+          <a:bodyPr spcFirstLastPara="1" wrap="square" lIns="68575" tIns="34275" rIns="68575" bIns="34275" anchor="t" anchorCtr="0">
+            <a:spAutoFit/>
+          </a:bodyPr>
+          <a:lstStyle/>
+          <a:p>
+            <a:pPr marL="0" marR="0" lvl="0" indent="0" algn="ctr" rtl="0">
+              <a:spcBef>
+                <a:spcPts val="0"/>
+              </a:spcBef>
+              <a:spcAft>
+                <a:spcPts val="0"/>
+              </a:spcAft>
+              <a:buNone/>
+            </a:pPr>
+            <a:endParaRPr sz="1100">
+              <a:solidFill>
+                <a:schemeClr val="lt1"/>
+              </a:solidFill>
+              <a:latin typeface="Arial"/>
+              <a:ea typeface="Arial"/>
+              <a:cs typeface="Arial"/>
+              <a:sym typeface="Arial"/>
+            </a:endParaRPr>
+          </a:p>
+        </p:txBody>
+      </p:sp>
+      <p:sp>
+        <p:nvSpPr>
+          <p:cNvPr id="166" name="Google Shape;166;p28"/>
+          <p:cNvSpPr txBox="1"/>
+          <p:nvPr/>
+        </p:nvSpPr>
+        <p:spPr>
+          <a:xfrm>
+            <a:off x="7422919" y="4868275"/>
+            <a:ext cx="1660500" cy="238500"/>
+          </a:xfrm>
+          <a:prstGeom prst="rect">
+            <a:avLst/>
+          </a:prstGeom>
+          <a:noFill/>
+          <a:ln>
+            <a:noFill/>
+          </a:ln>
+        </p:spPr>
+        <p:txBody>
+          <a:bodyPr spcFirstLastPara="1" wrap="square" lIns="68575" tIns="34275" rIns="68575" bIns="34275" anchor="t" anchorCtr="0">
+            <a:spAutoFit/>
+          </a:bodyPr>
+          <a:lstStyle/>
+          <a:p>
+            <a:pPr marL="0" marR="0" lvl="0" indent="0" algn="r" rtl="0">
+              <a:spcBef>
+                <a:spcPts val="0"/>
+              </a:spcBef>
+              <a:spcAft>
+                <a:spcPts val="0"/>
+              </a:spcAft>
+              <a:buNone/>
+            </a:pPr>
+            <a:r>
+              <a:rPr lang="zh-TW" sz="1100">
+                <a:solidFill>
+                  <a:srgbClr val="A5A5A5"/>
+                </a:solidFill>
+                <a:latin typeface="Consolas"/>
+                <a:ea typeface="Consolas"/>
+                <a:cs typeface="Consolas"/>
+                <a:sym typeface="Consolas"/>
+              </a:rPr>
+              <a:t>NTUST GAMELab</a:t>
+            </a:r>
+            <a:endParaRPr sz="1100">
+              <a:solidFill>
+                <a:srgbClr val="A5A5A5"/>
+              </a:solidFill>
+              <a:latin typeface="Consolas"/>
+              <a:ea typeface="Consolas"/>
+              <a:cs typeface="Consolas"/>
+              <a:sym typeface="Consolas"/>
+            </a:endParaRPr>
+          </a:p>
+        </p:txBody>
+      </p:sp>
+      <p:sp>
+        <p:nvSpPr>
+          <p:cNvPr id="167" name="Google Shape;167;p28"/>
+          <p:cNvSpPr txBox="1">
+            <a:spLocks noGrp="1"/>
+          </p:cNvSpPr>
+          <p:nvPr>
+            <p:ph type="sldNum" idx="12"/>
+          </p:nvPr>
+        </p:nvSpPr>
+        <p:spPr>
+          <a:xfrm>
+            <a:off x="3543300" y="4904660"/>
+            <a:ext cx="2057400" cy="273900"/>
+          </a:xfrm>
+          <a:prstGeom prst="rect">
+            <a:avLst/>
+          </a:prstGeom>
+          <a:noFill/>
+          <a:ln>
+            <a:noFill/>
+          </a:ln>
+        </p:spPr>
+        <p:txBody>
+          <a:bodyPr spcFirstLastPara="1" wrap="square" lIns="68575" tIns="34275" rIns="68575" bIns="34275" anchor="ctr" anchorCtr="0">
+            <a:noAutofit/>
+          </a:bodyPr>
+          <a:lstStyle/>
+          <a:p>
+            <a:pPr marL="0" lvl="0" indent="0" algn="ctr" rtl="0">
+              <a:spcBef>
+                <a:spcPts val="0"/>
+              </a:spcBef>
+              <a:spcAft>
+                <a:spcPts val="0"/>
+              </a:spcAft>
+              <a:buNone/>
+            </a:pPr>
+            <a:fld id="{00000000-1234-1234-1234-123412341234}" type="slidenum">
+              <a:rPr lang="en-US" altLang="zh-TW" sz="1100"/>
+              <a:t>26</a:t>
+            </a:fld>
+            <a:endParaRPr sz="1100"/>
+          </a:p>
+        </p:txBody>
+      </p:sp>
+      <p:grpSp>
+        <p:nvGrpSpPr>
+          <p:cNvPr id="6" name="群組 5">
+            <a:extLst>
+              <a:ext uri="{FF2B5EF4-FFF2-40B4-BE49-F238E27FC236}">
+                <a16:creationId xmlns:a16="http://schemas.microsoft.com/office/drawing/2014/main" id="{1539F715-6E4A-488B-A307-E4F799DDC262}"/>
+              </a:ext>
+            </a:extLst>
+          </p:cNvPr>
+          <p:cNvGrpSpPr/>
+          <p:nvPr/>
+        </p:nvGrpSpPr>
+        <p:grpSpPr>
+          <a:xfrm>
+            <a:off x="2941608" y="851317"/>
+            <a:ext cx="6202392" cy="3254821"/>
+            <a:chOff x="471906" y="852083"/>
+            <a:chExt cx="7302954" cy="3800677"/>
+          </a:xfrm>
+        </p:grpSpPr>
+        <p:pic>
+          <p:nvPicPr>
+            <p:cNvPr id="4098" name="Picture 2" descr="結構">
+              <a:extLst>
+                <a:ext uri="{FF2B5EF4-FFF2-40B4-BE49-F238E27FC236}">
+                  <a16:creationId xmlns:a16="http://schemas.microsoft.com/office/drawing/2014/main" id="{2CCBA7B7-13F6-4413-86B2-C225D63ABEE2}"/>
+                </a:ext>
+              </a:extLst>
+            </p:cNvPr>
+            <p:cNvPicPr>
+              <a:picLocks noChangeAspect="1" noChangeArrowheads="1"/>
+            </p:cNvPicPr>
+            <p:nvPr/>
+          </p:nvPicPr>
+          <p:blipFill>
+            <a:blip r:embed="rId3">
+              <a:extLst>
+                <a:ext uri="{28A0092B-C50C-407E-A947-70E740481C1C}">
+                  <a14:useLocalDpi xmlns:a14="http://schemas.microsoft.com/office/drawing/2010/main" val="0"/>
+                </a:ext>
+              </a:extLst>
+            </a:blip>
+            <a:srcRect/>
+            <a:stretch>
+              <a:fillRect/>
+            </a:stretch>
+          </p:blipFill>
+          <p:spPr bwMode="auto">
+            <a:xfrm>
+              <a:off x="471906" y="852083"/>
+              <a:ext cx="7302954" cy="3800677"/>
+            </a:xfrm>
+            <a:prstGeom prst="rect">
+              <a:avLst/>
+            </a:prstGeom>
+            <a:noFill/>
+            <a:extLst>
+              <a:ext uri="{909E8E84-426E-40DD-AFC4-6F175D3DCCD1}">
+                <a14:hiddenFill xmlns:a14="http://schemas.microsoft.com/office/drawing/2010/main">
+                  <a:solidFill>
+                    <a:srgbClr val="FFFFFF"/>
+                  </a:solidFill>
+                </a14:hiddenFill>
+              </a:ext>
+            </a:extLst>
+          </p:spPr>
+        </p:pic>
+        <p:cxnSp>
+          <p:nvCxnSpPr>
+            <p:cNvPr id="5" name="直線單箭頭接點 4">
+              <a:extLst>
+                <a:ext uri="{FF2B5EF4-FFF2-40B4-BE49-F238E27FC236}">
+                  <a16:creationId xmlns:a16="http://schemas.microsoft.com/office/drawing/2014/main" id="{B0188845-15EE-49C6-ADE3-853FC7461714}"/>
+                </a:ext>
+              </a:extLst>
+            </p:cNvPr>
+            <p:cNvCxnSpPr/>
+            <p:nvPr/>
+          </p:nvCxnSpPr>
+          <p:spPr>
+            <a:xfrm flipV="1">
+              <a:off x="2375807" y="1338943"/>
+              <a:ext cx="0" cy="751114"/>
+            </a:xfrm>
+            <a:prstGeom prst="straightConnector1">
+              <a:avLst/>
+            </a:prstGeom>
+            <a:ln>
+              <a:solidFill>
+                <a:srgbClr val="FF0000"/>
+              </a:solidFill>
+              <a:tailEnd type="triangle"/>
+            </a:ln>
+          </p:spPr>
+          <p:style>
+            <a:lnRef idx="1">
+              <a:schemeClr val="accent1"/>
+            </a:lnRef>
+            <a:fillRef idx="0">
+              <a:schemeClr val="accent1"/>
+            </a:fillRef>
+            <a:effectRef idx="0">
+              <a:schemeClr val="accent1"/>
+            </a:effectRef>
+            <a:fontRef idx="minor">
+              <a:schemeClr val="tx1"/>
+            </a:fontRef>
+          </p:style>
+        </p:cxnSp>
+        <p:cxnSp>
+          <p:nvCxnSpPr>
+            <p:cNvPr id="19" name="直線單箭頭接點 18">
+              <a:extLst>
+                <a:ext uri="{FF2B5EF4-FFF2-40B4-BE49-F238E27FC236}">
+                  <a16:creationId xmlns:a16="http://schemas.microsoft.com/office/drawing/2014/main" id="{73D90099-F048-4099-BCCC-8AE8A5B11E14}"/>
+                </a:ext>
+              </a:extLst>
+            </p:cNvPr>
+            <p:cNvCxnSpPr/>
+            <p:nvPr/>
+          </p:nvCxnSpPr>
+          <p:spPr>
+            <a:xfrm flipV="1">
+              <a:off x="2683328" y="1338943"/>
+              <a:ext cx="0" cy="751114"/>
+            </a:xfrm>
+            <a:prstGeom prst="straightConnector1">
+              <a:avLst/>
+            </a:prstGeom>
+            <a:ln>
+              <a:solidFill>
+                <a:srgbClr val="FF0000"/>
+              </a:solidFill>
+              <a:tailEnd type="triangle"/>
+            </a:ln>
+          </p:spPr>
+          <p:style>
+            <a:lnRef idx="1">
+              <a:schemeClr val="accent1"/>
+            </a:lnRef>
+            <a:fillRef idx="0">
+              <a:schemeClr val="accent1"/>
+            </a:fillRef>
+            <a:effectRef idx="0">
+              <a:schemeClr val="accent1"/>
+            </a:effectRef>
+            <a:fontRef idx="minor">
+              <a:schemeClr val="tx1"/>
+            </a:fontRef>
+          </p:style>
+        </p:cxnSp>
+        <p:cxnSp>
+          <p:nvCxnSpPr>
+            <p:cNvPr id="20" name="直線單箭頭接點 19">
+              <a:extLst>
+                <a:ext uri="{FF2B5EF4-FFF2-40B4-BE49-F238E27FC236}">
+                  <a16:creationId xmlns:a16="http://schemas.microsoft.com/office/drawing/2014/main" id="{69729468-54EC-45AD-A1DE-E798BB9397C8}"/>
+                </a:ext>
+              </a:extLst>
+            </p:cNvPr>
+            <p:cNvCxnSpPr/>
+            <p:nvPr/>
+          </p:nvCxnSpPr>
+          <p:spPr>
+            <a:xfrm flipV="1">
+              <a:off x="3039834" y="1338943"/>
+              <a:ext cx="0" cy="751114"/>
+            </a:xfrm>
+            <a:prstGeom prst="straightConnector1">
+              <a:avLst/>
+            </a:prstGeom>
+            <a:ln>
+              <a:solidFill>
+                <a:srgbClr val="FF0000"/>
+              </a:solidFill>
+              <a:tailEnd type="triangle"/>
+            </a:ln>
+          </p:spPr>
+          <p:style>
+            <a:lnRef idx="1">
+              <a:schemeClr val="accent1"/>
+            </a:lnRef>
+            <a:fillRef idx="0">
+              <a:schemeClr val="accent1"/>
+            </a:fillRef>
+            <a:effectRef idx="0">
+              <a:schemeClr val="accent1"/>
+            </a:effectRef>
+            <a:fontRef idx="minor">
+              <a:schemeClr val="tx1"/>
+            </a:fontRef>
+          </p:style>
+        </p:cxnSp>
+        <p:cxnSp>
+          <p:nvCxnSpPr>
+            <p:cNvPr id="21" name="直線單箭頭接點 20">
+              <a:extLst>
+                <a:ext uri="{FF2B5EF4-FFF2-40B4-BE49-F238E27FC236}">
+                  <a16:creationId xmlns:a16="http://schemas.microsoft.com/office/drawing/2014/main" id="{ED024A0C-85FE-4B03-909D-FCC36FA361C8}"/>
+                </a:ext>
+              </a:extLst>
+            </p:cNvPr>
+            <p:cNvCxnSpPr/>
+            <p:nvPr/>
+          </p:nvCxnSpPr>
+          <p:spPr>
+            <a:xfrm flipV="1">
+              <a:off x="3377292" y="1338943"/>
+              <a:ext cx="0" cy="751114"/>
+            </a:xfrm>
+            <a:prstGeom prst="straightConnector1">
+              <a:avLst/>
+            </a:prstGeom>
+            <a:ln>
+              <a:solidFill>
+                <a:srgbClr val="FF0000"/>
+              </a:solidFill>
+              <a:tailEnd type="triangle"/>
+            </a:ln>
+          </p:spPr>
+          <p:style>
+            <a:lnRef idx="1">
+              <a:schemeClr val="accent1"/>
+            </a:lnRef>
+            <a:fillRef idx="0">
+              <a:schemeClr val="accent1"/>
+            </a:fillRef>
+            <a:effectRef idx="0">
+              <a:schemeClr val="accent1"/>
+            </a:effectRef>
+            <a:fontRef idx="minor">
+              <a:schemeClr val="tx1"/>
+            </a:fontRef>
+          </p:style>
+        </p:cxnSp>
+        <p:cxnSp>
+          <p:nvCxnSpPr>
+            <p:cNvPr id="22" name="直線單箭頭接點 21">
+              <a:extLst>
+                <a:ext uri="{FF2B5EF4-FFF2-40B4-BE49-F238E27FC236}">
+                  <a16:creationId xmlns:a16="http://schemas.microsoft.com/office/drawing/2014/main" id="{CE7E59F0-4897-4EE7-AC0C-D11D628F7832}"/>
+                </a:ext>
+              </a:extLst>
+            </p:cNvPr>
+            <p:cNvCxnSpPr/>
+            <p:nvPr/>
+          </p:nvCxnSpPr>
+          <p:spPr>
+            <a:xfrm flipV="1">
+              <a:off x="3684813" y="1338943"/>
+              <a:ext cx="0" cy="751114"/>
+            </a:xfrm>
+            <a:prstGeom prst="straightConnector1">
+              <a:avLst/>
+            </a:prstGeom>
+            <a:ln>
+              <a:solidFill>
+                <a:srgbClr val="FF0000"/>
+              </a:solidFill>
+              <a:tailEnd type="triangle"/>
+            </a:ln>
+          </p:spPr>
+          <p:style>
+            <a:lnRef idx="1">
+              <a:schemeClr val="accent1"/>
+            </a:lnRef>
+            <a:fillRef idx="0">
+              <a:schemeClr val="accent1"/>
+            </a:fillRef>
+            <a:effectRef idx="0">
+              <a:schemeClr val="accent1"/>
+            </a:effectRef>
+            <a:fontRef idx="minor">
+              <a:schemeClr val="tx1"/>
+            </a:fontRef>
+          </p:style>
+        </p:cxnSp>
+        <p:cxnSp>
+          <p:nvCxnSpPr>
+            <p:cNvPr id="23" name="直線單箭頭接點 22">
+              <a:extLst>
+                <a:ext uri="{FF2B5EF4-FFF2-40B4-BE49-F238E27FC236}">
+                  <a16:creationId xmlns:a16="http://schemas.microsoft.com/office/drawing/2014/main" id="{7C118F7C-66DF-4B00-8785-D20C5CE03C30}"/>
+                </a:ext>
+              </a:extLst>
+            </p:cNvPr>
+            <p:cNvCxnSpPr/>
+            <p:nvPr/>
+          </p:nvCxnSpPr>
+          <p:spPr>
+            <a:xfrm flipV="1">
+              <a:off x="4000498" y="1338943"/>
+              <a:ext cx="0" cy="751114"/>
+            </a:xfrm>
+            <a:prstGeom prst="straightConnector1">
+              <a:avLst/>
+            </a:prstGeom>
+            <a:ln>
+              <a:solidFill>
+                <a:srgbClr val="FF0000"/>
+              </a:solidFill>
+              <a:tailEnd type="triangle"/>
+            </a:ln>
+          </p:spPr>
+          <p:style>
+            <a:lnRef idx="1">
+              <a:schemeClr val="accent1"/>
+            </a:lnRef>
+            <a:fillRef idx="0">
+              <a:schemeClr val="accent1"/>
+            </a:fillRef>
+            <a:effectRef idx="0">
+              <a:schemeClr val="accent1"/>
+            </a:effectRef>
+            <a:fontRef idx="minor">
+              <a:schemeClr val="tx1"/>
+            </a:fontRef>
+          </p:style>
+        </p:cxnSp>
+        <p:cxnSp>
+          <p:nvCxnSpPr>
+            <p:cNvPr id="24" name="直線單箭頭接點 23">
+              <a:extLst>
+                <a:ext uri="{FF2B5EF4-FFF2-40B4-BE49-F238E27FC236}">
+                  <a16:creationId xmlns:a16="http://schemas.microsoft.com/office/drawing/2014/main" id="{B54CFFC2-9254-4BA0-B714-919452F4094F}"/>
+                </a:ext>
+              </a:extLst>
+            </p:cNvPr>
+            <p:cNvCxnSpPr/>
+            <p:nvPr/>
+          </p:nvCxnSpPr>
+          <p:spPr>
+            <a:xfrm flipV="1">
+              <a:off x="4400550" y="1338943"/>
+              <a:ext cx="0" cy="751114"/>
+            </a:xfrm>
+            <a:prstGeom prst="straightConnector1">
+              <a:avLst/>
+            </a:prstGeom>
+            <a:ln>
+              <a:solidFill>
+                <a:srgbClr val="FF0000"/>
+              </a:solidFill>
+              <a:tailEnd type="triangle"/>
+            </a:ln>
+          </p:spPr>
+          <p:style>
+            <a:lnRef idx="1">
+              <a:schemeClr val="accent1"/>
+            </a:lnRef>
+            <a:fillRef idx="0">
+              <a:schemeClr val="accent1"/>
+            </a:fillRef>
+            <a:effectRef idx="0">
+              <a:schemeClr val="accent1"/>
+            </a:effectRef>
+            <a:fontRef idx="minor">
+              <a:schemeClr val="tx1"/>
+            </a:fontRef>
+          </p:style>
+        </p:cxnSp>
+        <p:cxnSp>
+          <p:nvCxnSpPr>
+            <p:cNvPr id="25" name="直線單箭頭接點 24">
+              <a:extLst>
+                <a:ext uri="{FF2B5EF4-FFF2-40B4-BE49-F238E27FC236}">
+                  <a16:creationId xmlns:a16="http://schemas.microsoft.com/office/drawing/2014/main" id="{8764228D-596B-413C-B879-21977C910499}"/>
+                </a:ext>
+              </a:extLst>
+            </p:cNvPr>
+            <p:cNvCxnSpPr/>
+            <p:nvPr/>
+          </p:nvCxnSpPr>
+          <p:spPr>
+            <a:xfrm flipV="1">
+              <a:off x="4708071" y="1338943"/>
+              <a:ext cx="0" cy="751114"/>
+            </a:xfrm>
+            <a:prstGeom prst="straightConnector1">
+              <a:avLst/>
+            </a:prstGeom>
+            <a:ln>
+              <a:solidFill>
+                <a:srgbClr val="FF0000"/>
+              </a:solidFill>
+              <a:tailEnd type="triangle"/>
+            </a:ln>
+          </p:spPr>
+          <p:style>
+            <a:lnRef idx="1">
+              <a:schemeClr val="accent1"/>
+            </a:lnRef>
+            <a:fillRef idx="0">
+              <a:schemeClr val="accent1"/>
+            </a:fillRef>
+            <a:effectRef idx="0">
+              <a:schemeClr val="accent1"/>
+            </a:effectRef>
+            <a:fontRef idx="minor">
+              <a:schemeClr val="tx1"/>
+            </a:fontRef>
+          </p:style>
+        </p:cxnSp>
+        <p:cxnSp>
+          <p:nvCxnSpPr>
+            <p:cNvPr id="26" name="直線單箭頭接點 25">
+              <a:extLst>
+                <a:ext uri="{FF2B5EF4-FFF2-40B4-BE49-F238E27FC236}">
+                  <a16:creationId xmlns:a16="http://schemas.microsoft.com/office/drawing/2014/main" id="{850B96CC-87B9-4A94-86EC-7426017EB630}"/>
+                </a:ext>
+              </a:extLst>
+            </p:cNvPr>
+            <p:cNvCxnSpPr/>
+            <p:nvPr/>
+          </p:nvCxnSpPr>
+          <p:spPr>
+            <a:xfrm flipV="1">
+              <a:off x="5023756" y="1338943"/>
+              <a:ext cx="0" cy="751114"/>
+            </a:xfrm>
+            <a:prstGeom prst="straightConnector1">
+              <a:avLst/>
+            </a:prstGeom>
+            <a:ln>
+              <a:solidFill>
+                <a:srgbClr val="FF0000"/>
+              </a:solidFill>
+              <a:tailEnd type="triangle"/>
+            </a:ln>
+          </p:spPr>
+          <p:style>
+            <a:lnRef idx="1">
+              <a:schemeClr val="accent1"/>
+            </a:lnRef>
+            <a:fillRef idx="0">
+              <a:schemeClr val="accent1"/>
+            </a:fillRef>
+            <a:effectRef idx="0">
+              <a:schemeClr val="accent1"/>
+            </a:effectRef>
+            <a:fontRef idx="minor">
+              <a:schemeClr val="tx1"/>
+            </a:fontRef>
+          </p:style>
+        </p:cxnSp>
+      </p:grpSp>
+    </p:spTree>
+    <p:extLst>
+      <p:ext uri="{BB962C8B-B14F-4D97-AF65-F5344CB8AC3E}">
+        <p14:creationId xmlns:p14="http://schemas.microsoft.com/office/powerpoint/2010/main" val="4109834149"/>
+      </p:ext>
+    </p:extLst>
+  </p:cSld>
+  <p:clrMapOvr>
+    <a:masterClrMapping/>
+  </p:clrMapOvr>
+  <p:transition spd="slow">
+    <p:push/>
+  </p:transition>
+</p:sld>
+</file>
+
 <file path=ppt/slides/slide3.xml><?xml version="1.0" encoding="utf-8"?>
 <p:sld xmlns:a="http://schemas.openxmlformats.org/drawingml/2006/main" xmlns:r="http://schemas.openxmlformats.org/officeDocument/2006/relationships" xmlns:p="http://schemas.openxmlformats.org/presentationml/2006/main">
   <p:cSld>
@@ -28553,7 +30499,7 @@
         <p:spPr>
           <a:xfrm>
             <a:off x="471900" y="886850"/>
-            <a:ext cx="8252100" cy="2492960"/>
+            <a:ext cx="8252100" cy="2031295"/>
           </a:xfrm>
           <a:prstGeom prst="rect">
             <a:avLst/>
@@ -28596,31 +30542,19 @@
                 <a:cs typeface="Microsoft JhengHei"/>
                 <a:sym typeface="Microsoft JhengHei"/>
               </a:rPr>
-              <a:t>Deep learning today can easily overfit million of images and begin to demand </a:t>
+              <a:t>Deep learning can easily overfit million of images b</a:t>
             </a:r>
             <a:r>
               <a:rPr lang="en-US" altLang="zh-TW" sz="2000" dirty="0">
                 <a:solidFill>
-                  <a:srgbClr val="FF0000"/>
+                  <a:schemeClr val="tx1"/>
                 </a:solidFill>
                 <a:latin typeface="Microsoft JhengHei"/>
                 <a:ea typeface="Microsoft JhengHei"/>
                 <a:cs typeface="Microsoft JhengHei"/>
                 <a:sym typeface="Microsoft JhengHei"/>
               </a:rPr>
-              <a:t>often publicly inaccessible</a:t>
-            </a:r>
-            <a:r>
-              <a:rPr lang="en-US" sz="2000" dirty="0">
-                <a:solidFill>
-                  <a:srgbClr val="FF0000"/>
-                </a:solidFill>
-                <a:latin typeface="Microsoft JhengHei"/>
-                <a:ea typeface="Microsoft JhengHei"/>
-                <a:cs typeface="Microsoft JhengHei"/>
-                <a:sym typeface="Microsoft JhengHei"/>
-              </a:rPr>
-              <a:t> </a:t>
+              <a:t>ut label image is usually private</a:t>
             </a:r>
             <a:r>
               <a:rPr lang="en-US" sz="2000" dirty="0">
@@ -28632,7 +30566,7 @@
                 <a:cs typeface="Microsoft JhengHei"/>
                 <a:sym typeface="Microsoft JhengHei"/>
               </a:rPr>
-              <a:t>labeled images.</a:t>
+              <a:t>.</a:t>
             </a:r>
           </a:p>
           <a:p>
@@ -28687,7 +30621,7 @@
                 <a:cs typeface="Microsoft JhengHei"/>
                 <a:sym typeface="Microsoft JhengHei"/>
               </a:rPr>
-              <a:t>.  The solutions based on autoregressive language modeling(</a:t>
+              <a:t>.  The solutions based on </a:t>
             </a:r>
             <a:r>
               <a:rPr lang="en-US" altLang="zh-TW" sz="2000" dirty="0">
@@ -28711,7 +30645,7 @@
                 <a:cs typeface="Microsoft JhengHei"/>
                 <a:sym typeface="Microsoft JhengHei"/>
               </a:rPr>
-              <a:t>) and masked autoencoding (</a:t>
+              <a:t> and </a:t>
             </a:r>
             <a:r>
               <a:rPr lang="en-US" altLang="zh-TW" sz="2000" dirty="0">
@@ -28735,7 +30669,7 @@
                 <a:cs typeface="Microsoft JhengHei"/>
                 <a:sym typeface="Microsoft JhengHei"/>
               </a:rPr>
-              <a:t>).</a:t>
+              <a:t>.</a:t>
             </a:r>
           </a:p>
         </p:txBody>
@@ -29105,7 +31039,7 @@
                 <a:cs typeface="Microsoft JhengHei"/>
                 <a:sym typeface="Microsoft JhengHei"/>
               </a:rPr>
-              <a:t>Autoencoding methods is</a:t>
+              <a:t>Autoencoder is</a:t>
             </a:r>
             <a:r>
               <a:rPr lang="zh-TW" altLang="en-US" b="1" dirty="0">
@@ -29207,7 +31141,7 @@
                 <a:latin typeface="Microsoft JhengHei"/>
                 <a:ea typeface="Microsoft JhengHei"/>
               </a:rPr>
-              <a:t>CNN were dominant in vision over the last decade. Convolutions operate on regular grids and it is not easily put mask tokens(BERT)</a:t>
+              <a:t>Convolutions operate on regular grids and it is not easily put mask tokens(BERT)</a:t>
             </a:r>
             <a:r>
               <a:rPr lang="zh-TW" altLang="en-US" dirty="0">
@@ -29283,7 +31217,7 @@
                 <a:effectLst/>
                 <a:latin typeface="Arial" panose="020B0604020202020204" pitchFamily="34" charset="0"/>
               </a:rPr>
-              <a:t>In vision, autoencoder’s decode output a lower semantic level than recognition tasks. Contrast to language, decoder predicts missing words that contain rich semantic information.</a:t>
+              <a:t>In vision, autoencoder’s decode is a low semantic information. In language, decoder predicts missing words contain rich semantic information.</a:t>
             </a:r>
             <a:endParaRPr lang="en-US" altLang="zh-TW" dirty="0">
               <a:solidFill>
@@ -29660,7 +31594,7 @@
         <p:spPr>
           <a:xfrm>
             <a:off x="0" y="733172"/>
-            <a:ext cx="3674076" cy="4247286"/>
+            <a:ext cx="3674076" cy="2400627"/>
           </a:xfrm>
           <a:prstGeom prst="rect">
             <a:avLst/>
@@ -29675,23 +31609,6 @@
             <a:spAutoFit/>
           </a:bodyPr>
           <a:lstStyle/>
-          <a:p>
-            <a:pPr marL="368300" lvl="0" indent="-228600">
-              <a:lnSpc>
-                <a:spcPct val="150000"/>
-              </a:lnSpc>
-              <a:buClr>
-                <a:schemeClr val="dk1"/>
-              </a:buClr>
-              <a:buSzPts val="1400"/>
-              <a:buFont typeface="+mj-lt"/>
-              <a:buAutoNum type="arabicPeriod"/>
-            </a:pPr>
-            <a:r>
-              <a:rPr lang="en-US" altLang="zh-TW" sz="1600" dirty="0"/>
-              <a:t>Decoder reconstructs latent representation along with mask tokens.</a:t>
-            </a:r>
-          </a:p>
           <a:p>
             <a:pPr marL="368300" lvl="0" indent="-228600">
               <a:lnSpc>
@@ -29731,7 +31648,7 @@
             </a:pPr>
             <a:r>
               <a:rPr lang="en-US" altLang="zh-TW" sz="1600" dirty="0"/>
-              <a:t>Transfer learning on object detection, instance segmentation, and semantic segmentation achieves better results than its supervised pretrain.</a:t>
+              <a:t>Transfer learning on other vision  tasks achieves better results than its supervised pretrain.</a:t>
             </a:r>
           </a:p>
         </p:txBody>
@@ -30371,6 +32288,53 @@
           </a:p>
         </p:txBody>
       </p:sp>
+      <p:pic>
+        <p:nvPicPr>
+          <p:cNvPr id="2050" name="Picture 2">
+            <a:extLst>
+              <a:ext uri="{FF2B5EF4-FFF2-40B4-BE49-F238E27FC236}">
+                <a16:creationId xmlns:a16="http://schemas.microsoft.com/office/drawing/2014/main" id="{C888CB98-FB5A-A016-6D77-40D44E91D964}"/>
+              </a:ext>
+            </a:extLst>
+          </p:cNvPr>
+          <p:cNvPicPr>
+            <a:picLocks noChangeAspect="1" noChangeArrowheads="1"/>
+          </p:cNvPicPr>
+          <p:nvPr/>
+        </p:nvPicPr>
+        <p:blipFill>
+          <a:blip r:embed="rId3">
+            <a:extLst>
+              <a:ext uri="{28A0092B-C50C-407E-A947-70E740481C1C}">
+                <a14:useLocalDpi xmlns:a14="http://schemas.microsoft.com/office/drawing/2010/main" val="0"/>
+              </a:ext>
+            </a:extLst>
+          </a:blip>
+          <a:srcRect/>
+          <a:stretch>
+            <a:fillRect/>
+          </a:stretch>
+        </p:blipFill>
+        <p:spPr bwMode="auto">
+          <a:xfrm>
+            <a:off x="3084060" y="2040982"/>
+            <a:ext cx="6059940" cy="2738546"/>
+          </a:xfrm>
+          <a:prstGeom prst="rect">
+            <a:avLst/>
+          </a:prstGeom>
+          <a:noFill/>
+          <a:extLst>
+            <a:ext uri="{909E8E84-426E-40DD-AFC4-6F175D3DCCD1}">
+              <a14:hiddenFill xmlns:a14="http://schemas.microsoft.com/office/drawing/2010/main">
+                <a:solidFill>
+                  <a:srgbClr val="FFFFFF"/>
+                </a:solidFill>
+              </a14:hiddenFill>
+            </a:ext>
+          </a:extLst>
+        </p:spPr>
+      </p:pic>
     </p:spTree>
     <p:extLst>
       <p:ext uri="{BB962C8B-B14F-4D97-AF65-F5344CB8AC3E}">

</xml_diff>